<commit_message>
update example video to remove hallucinations
</commit_message>
<xml_diff>
--- a/example/test.pptx
+++ b/example/test.pptx
@@ -1328,7 +1328,7 @@
             </a:pPr>
             <a:r>
               <a:rPr lang="en"/>
-              <a:t>It uses T T S from coqui AI X T T S 2 to generate speech.</a:t>
+              <a:t>It uses T T S from coqui A I X T T S 2 to generate speech.</a:t>
             </a:r>
             <a:endParaRPr/>
           </a:p>
@@ -1507,38 +1507,7 @@
             </a:pPr>
             <a:r>
               <a:rPr lang="en"/>
-              <a:t>Step 2 is running pip install.</a:t>
-            </a:r>
-            <a:endParaRPr/>
-          </a:p>
-          <a:p>
-            <a:pPr indent="0" lvl="0" marL="0" rtl="0" algn="l">
-              <a:spcBef>
-                <a:spcPts val="0"/>
-              </a:spcBef>
-              <a:spcAft>
-                <a:spcPts val="0"/>
-              </a:spcAft>
-              <a:buNone/>
-            </a:pPr>
-            <a:r>
-              <a:t/>
-            </a:r>
-            <a:endParaRPr/>
-          </a:p>
-          <a:p>
-            <a:pPr indent="0" lvl="0" marL="0" rtl="0" algn="l">
-              <a:spcBef>
-                <a:spcPts val="0"/>
-              </a:spcBef>
-              <a:spcAft>
-                <a:spcPts val="0"/>
-              </a:spcAft>
-              <a:buNone/>
-            </a:pPr>
-            <a:r>
-              <a:rPr lang="en"/>
-              <a:t>Step 3 is to manually export your powerpoint to PDF. This is needed because the tool cannot convert the powerpoint slide directly to images. There is a way to do it automatically, but you would need libre office installed which I think is overkill. After all, you are already manually creating the powerpoint slide, this is just 1 more manual step.</a:t>
+              <a:t>Step 2 is running pip install, step 3 is to manually export your powerpoint to PDF. This is needed because the tool cannot convert the powerpoint slide directly to images. There is a way to do it automatically, but you would need libre office installed which I think is overkill. After all, you are already manually creating the powerpoint slide, this is just 1 more manual step.</a:t>
             </a:r>
             <a:endParaRPr/>
           </a:p>
@@ -1732,7 +1701,7 @@
             </a:pPr>
             <a:r>
               <a:rPr lang="en"/>
-              <a:t>As I described before, this is using Coqui AI X T T S 2, which is a well known text to speech AI model. And it runs on your computer, no data is sent to open AI, it’s totally offline.</a:t>
+              <a:t>As I described before, this is using Coqui A I X T T S 2, which is a well known text to speech AI model. And it runs on your computer, no data is sent to Open A I, it’s totally offline.</a:t>
             </a:r>
             <a:endParaRPr/>
           </a:p>
@@ -7909,6 +7878,285 @@
 </file>
 
 <file path=ppt/theme/theme1.xml><?xml version="1.0" encoding="utf-8"?>
+<a:theme xmlns:a="http://schemas.openxmlformats.org/drawingml/2006/main" xmlns:r="http://schemas.openxmlformats.org/officeDocument/2006/relationships">
+  <a:themeElements>
+    <a:clrScheme name="Default">
+      <a:dk1>
+        <a:srgbClr val="000000"/>
+      </a:dk1>
+      <a:lt1>
+        <a:srgbClr val="FFFFFF"/>
+      </a:lt1>
+      <a:dk2>
+        <a:srgbClr val="158158"/>
+      </a:dk2>
+      <a:lt2>
+        <a:srgbClr val="F3F3F3"/>
+      </a:lt2>
+      <a:accent1>
+        <a:srgbClr val="058DC7"/>
+      </a:accent1>
+      <a:accent2>
+        <a:srgbClr val="50B432"/>
+      </a:accent2>
+      <a:accent3>
+        <a:srgbClr val="ED561B"/>
+      </a:accent3>
+      <a:accent4>
+        <a:srgbClr val="EDEF00"/>
+      </a:accent4>
+      <a:accent5>
+        <a:srgbClr val="24CBE5"/>
+      </a:accent5>
+      <a:accent6>
+        <a:srgbClr val="64E572"/>
+      </a:accent6>
+      <a:hlink>
+        <a:srgbClr val="2200CC"/>
+      </a:hlink>
+      <a:folHlink>
+        <a:srgbClr val="551A8B"/>
+      </a:folHlink>
+    </a:clrScheme>
+    <a:fontScheme name="Office">
+      <a:majorFont>
+        <a:latin typeface="Arial"/>
+        <a:ea typeface=""/>
+        <a:cs typeface=""/>
+        <a:font script="Jpan" typeface="ＭＳ Ｐゴシック"/>
+        <a:font script="Hang" typeface="맑은 고딕"/>
+        <a:font script="Hans" typeface="宋体"/>
+        <a:font script="Hant" typeface="新細明體"/>
+        <a:font script="Arab" typeface="Times New Roman"/>
+        <a:font script="Hebr" typeface="Times New Roman"/>
+        <a:font script="Thai" typeface="Angsana New"/>
+        <a:font script="Ethi" typeface="Nyala"/>
+        <a:font script="Beng" typeface="Vrinda"/>
+        <a:font script="Gujr" typeface="Shruti"/>
+        <a:font script="Khmr" typeface="MoolBoran"/>
+        <a:font script="Knda" typeface="Tunga"/>
+        <a:font script="Guru" typeface="Raavi"/>
+        <a:font script="Cans" typeface="Euphemia"/>
+        <a:font script="Cher" typeface="Plantagenet Cherokee"/>
+        <a:font script="Yiii" typeface="Microsoft Yi Baiti"/>
+        <a:font script="Tibt" typeface="Microsoft Himalaya"/>
+        <a:font script="Thaa" typeface="MV Boli"/>
+        <a:font script="Deva" typeface="Mangal"/>
+        <a:font script="Telu" typeface="Gautami"/>
+        <a:font script="Taml" typeface="Latha"/>
+        <a:font script="Syrc" typeface="Estrangelo Edessa"/>
+        <a:font script="Orya" typeface="Kalinga"/>
+        <a:font script="Mlym" typeface="Kartika"/>
+        <a:font script="Laoo" typeface="DokChampa"/>
+        <a:font script="Sinh" typeface="Iskoola Pota"/>
+        <a:font script="Mong" typeface="Mongolian Baiti"/>
+        <a:font script="Viet" typeface="Times New Roman"/>
+        <a:font script="Uigh" typeface="Microsoft Uighur"/>
+        <a:font script="Geor" typeface="Sylfaen"/>
+      </a:majorFont>
+      <a:minorFont>
+        <a:latin typeface="Arial"/>
+        <a:ea typeface=""/>
+        <a:cs typeface=""/>
+        <a:font script="Jpan" typeface="ＭＳ Ｐゴシック"/>
+        <a:font script="Hang" typeface="맑은 고딕"/>
+        <a:font script="Hans" typeface="宋体"/>
+        <a:font script="Hant" typeface="新細明體"/>
+        <a:font script="Arab" typeface="Arial"/>
+        <a:font script="Hebr" typeface="Arial"/>
+        <a:font script="Thai" typeface="Cordia New"/>
+        <a:font script="Ethi" typeface="Nyala"/>
+        <a:font script="Beng" typeface="Vrinda"/>
+        <a:font script="Gujr" typeface="Shruti"/>
+        <a:font script="Khmr" typeface="DaunPenh"/>
+        <a:font script="Knda" typeface="Tunga"/>
+        <a:font script="Guru" typeface="Raavi"/>
+        <a:font script="Cans" typeface="Euphemia"/>
+        <a:font script="Cher" typeface="Plantagenet Cherokee"/>
+        <a:font script="Yiii" typeface="Microsoft Yi Baiti"/>
+        <a:font script="Tibt" typeface="Microsoft Himalaya"/>
+        <a:font script="Thaa" typeface="MV Boli"/>
+        <a:font script="Deva" typeface="Mangal"/>
+        <a:font script="Telu" typeface="Gautami"/>
+        <a:font script="Taml" typeface="Latha"/>
+        <a:font script="Syrc" typeface="Estrangelo Edessa"/>
+        <a:font script="Orya" typeface="Kalinga"/>
+        <a:font script="Mlym" typeface="Kartika"/>
+        <a:font script="Laoo" typeface="DokChampa"/>
+        <a:font script="Sinh" typeface="Iskoola Pota"/>
+        <a:font script="Mong" typeface="Mongolian Baiti"/>
+        <a:font script="Viet" typeface="Arial"/>
+        <a:font script="Uigh" typeface="Microsoft Uighur"/>
+        <a:font script="Geor" typeface="Sylfaen"/>
+      </a:minorFont>
+    </a:fontScheme>
+    <a:fmtScheme name="Office">
+      <a:fillStyleLst>
+        <a:solidFill>
+          <a:schemeClr val="phClr"/>
+        </a:solidFill>
+        <a:gradFill rotWithShape="1">
+          <a:gsLst>
+            <a:gs pos="0">
+              <a:schemeClr val="phClr">
+                <a:tint val="50000"/>
+                <a:satMod val="300000"/>
+              </a:schemeClr>
+            </a:gs>
+            <a:gs pos="35000">
+              <a:schemeClr val="phClr">
+                <a:tint val="37000"/>
+                <a:satMod val="300000"/>
+              </a:schemeClr>
+            </a:gs>
+            <a:gs pos="100000">
+              <a:schemeClr val="phClr">
+                <a:tint val="15000"/>
+                <a:satMod val="350000"/>
+              </a:schemeClr>
+            </a:gs>
+          </a:gsLst>
+          <a:lin ang="16200000" scaled="1"/>
+        </a:gradFill>
+        <a:gradFill rotWithShape="1">
+          <a:gsLst>
+            <a:gs pos="0">
+              <a:schemeClr val="phClr">
+                <a:tint val="100000"/>
+                <a:shade val="100000"/>
+                <a:satMod val="130000"/>
+              </a:schemeClr>
+            </a:gs>
+            <a:gs pos="100000">
+              <a:schemeClr val="phClr">
+                <a:tint val="50000"/>
+                <a:shade val="100000"/>
+                <a:satMod val="350000"/>
+              </a:schemeClr>
+            </a:gs>
+          </a:gsLst>
+          <a:lin ang="16200000" scaled="0"/>
+        </a:gradFill>
+      </a:fillStyleLst>
+      <a:lnStyleLst>
+        <a:ln w="9525" cap="flat" cmpd="sng" algn="ctr">
+          <a:solidFill>
+            <a:schemeClr val="phClr">
+              <a:shade val="95000"/>
+              <a:satMod val="105000"/>
+            </a:schemeClr>
+          </a:solidFill>
+          <a:prstDash val="solid"/>
+        </a:ln>
+        <a:ln w="25400" cap="flat" cmpd="sng" algn="ctr">
+          <a:solidFill>
+            <a:schemeClr val="phClr"/>
+          </a:solidFill>
+          <a:prstDash val="solid"/>
+        </a:ln>
+        <a:ln w="38100" cap="flat" cmpd="sng" algn="ctr">
+          <a:solidFill>
+            <a:schemeClr val="phClr"/>
+          </a:solidFill>
+          <a:prstDash val="solid"/>
+        </a:ln>
+      </a:lnStyleLst>
+      <a:effectStyleLst>
+        <a:effectStyle>
+          <a:effectLst>
+            <a:outerShdw blurRad="40000" dist="20000" dir="5400000" rotWithShape="0">
+              <a:srgbClr val="000000">
+                <a:alpha val="38000"/>
+              </a:srgbClr>
+            </a:outerShdw>
+          </a:effectLst>
+        </a:effectStyle>
+        <a:effectStyle>
+          <a:effectLst>
+            <a:outerShdw blurRad="40000" dist="23000" dir="5400000" rotWithShape="0">
+              <a:srgbClr val="000000">
+                <a:alpha val="35000"/>
+              </a:srgbClr>
+            </a:outerShdw>
+          </a:effectLst>
+        </a:effectStyle>
+        <a:effectStyle>
+          <a:effectLst>
+            <a:outerShdw blurRad="40000" dist="23000" dir="5400000" rotWithShape="0">
+              <a:srgbClr val="000000">
+                <a:alpha val="35000"/>
+              </a:srgbClr>
+            </a:outerShdw>
+          </a:effectLst>
+          <a:scene3d>
+            <a:camera prst="orthographicFront">
+              <a:rot lat="0" lon="0" rev="0"/>
+            </a:camera>
+            <a:lightRig rig="threePt" dir="t">
+              <a:rot lat="0" lon="0" rev="1200000"/>
+            </a:lightRig>
+          </a:scene3d>
+          <a:sp3d>
+            <a:bevelT w="63500" h="25400"/>
+          </a:sp3d>
+        </a:effectStyle>
+      </a:effectStyleLst>
+      <a:bgFillStyleLst>
+        <a:solidFill>
+          <a:schemeClr val="phClr"/>
+        </a:solidFill>
+        <a:gradFill rotWithShape="1">
+          <a:gsLst>
+            <a:gs pos="0">
+              <a:schemeClr val="phClr">
+                <a:tint val="40000"/>
+                <a:satMod val="350000"/>
+              </a:schemeClr>
+            </a:gs>
+            <a:gs pos="40000">
+              <a:schemeClr val="phClr">
+                <a:tint val="45000"/>
+                <a:shade val="99000"/>
+                <a:satMod val="350000"/>
+              </a:schemeClr>
+            </a:gs>
+            <a:gs pos="100000">
+              <a:schemeClr val="phClr">
+                <a:shade val="20000"/>
+                <a:satMod val="255000"/>
+              </a:schemeClr>
+            </a:gs>
+          </a:gsLst>
+          <a:path path="circle">
+            <a:fillToRect l="50000" t="-80000" r="50000" b="180000"/>
+          </a:path>
+        </a:gradFill>
+        <a:gradFill rotWithShape="1">
+          <a:gsLst>
+            <a:gs pos="0">
+              <a:schemeClr val="phClr">
+                <a:tint val="80000"/>
+                <a:satMod val="300000"/>
+              </a:schemeClr>
+            </a:gs>
+            <a:gs pos="100000">
+              <a:schemeClr val="phClr">
+                <a:shade val="30000"/>
+                <a:satMod val="200000"/>
+              </a:schemeClr>
+            </a:gs>
+          </a:gsLst>
+          <a:path path="circle">
+            <a:fillToRect l="50000" t="50000" r="50000" b="50000"/>
+          </a:path>
+        </a:gradFill>
+      </a:bgFillStyleLst>
+    </a:fmtScheme>
+  </a:themeElements>
+</a:theme>
+</file>
+
+<file path=ppt/theme/theme2.xml><?xml version="1.0" encoding="utf-8"?>
 <a:theme xmlns:a="http://schemas.openxmlformats.org/drawingml/2006/main" xmlns:r="http://schemas.openxmlformats.org/officeDocument/2006/relationships" name="Simple Light">
   <a:themeElements>
     <a:clrScheme name="Simple Light">
@@ -8185,283 +8433,4 @@
     </a:fmtScheme>
   </a:themeElements>
 </a:theme>
-</file>
-
-<file path=ppt/theme/theme2.xml><?xml version="1.0" encoding="utf-8"?>
-<a:theme xmlns:a="http://schemas.openxmlformats.org/drawingml/2006/main" xmlns:r="http://schemas.openxmlformats.org/officeDocument/2006/relationships">
-  <a:themeElements>
-    <a:clrScheme name="Default">
-      <a:dk1>
-        <a:srgbClr val="000000"/>
-      </a:dk1>
-      <a:lt1>
-        <a:srgbClr val="FFFFFF"/>
-      </a:lt1>
-      <a:dk2>
-        <a:srgbClr val="158158"/>
-      </a:dk2>
-      <a:lt2>
-        <a:srgbClr val="F3F3F3"/>
-      </a:lt2>
-      <a:accent1>
-        <a:srgbClr val="058DC7"/>
-      </a:accent1>
-      <a:accent2>
-        <a:srgbClr val="50B432"/>
-      </a:accent2>
-      <a:accent3>
-        <a:srgbClr val="ED561B"/>
-      </a:accent3>
-      <a:accent4>
-        <a:srgbClr val="EDEF00"/>
-      </a:accent4>
-      <a:accent5>
-        <a:srgbClr val="24CBE5"/>
-      </a:accent5>
-      <a:accent6>
-        <a:srgbClr val="64E572"/>
-      </a:accent6>
-      <a:hlink>
-        <a:srgbClr val="2200CC"/>
-      </a:hlink>
-      <a:folHlink>
-        <a:srgbClr val="551A8B"/>
-      </a:folHlink>
-    </a:clrScheme>
-    <a:fontScheme name="Office">
-      <a:majorFont>
-        <a:latin typeface="Arial"/>
-        <a:ea typeface=""/>
-        <a:cs typeface=""/>
-        <a:font script="Jpan" typeface="ＭＳ Ｐゴシック"/>
-        <a:font script="Hang" typeface="맑은 고딕"/>
-        <a:font script="Hans" typeface="宋体"/>
-        <a:font script="Hant" typeface="新細明體"/>
-        <a:font script="Arab" typeface="Times New Roman"/>
-        <a:font script="Hebr" typeface="Times New Roman"/>
-        <a:font script="Thai" typeface="Angsana New"/>
-        <a:font script="Ethi" typeface="Nyala"/>
-        <a:font script="Beng" typeface="Vrinda"/>
-        <a:font script="Gujr" typeface="Shruti"/>
-        <a:font script="Khmr" typeface="MoolBoran"/>
-        <a:font script="Knda" typeface="Tunga"/>
-        <a:font script="Guru" typeface="Raavi"/>
-        <a:font script="Cans" typeface="Euphemia"/>
-        <a:font script="Cher" typeface="Plantagenet Cherokee"/>
-        <a:font script="Yiii" typeface="Microsoft Yi Baiti"/>
-        <a:font script="Tibt" typeface="Microsoft Himalaya"/>
-        <a:font script="Thaa" typeface="MV Boli"/>
-        <a:font script="Deva" typeface="Mangal"/>
-        <a:font script="Telu" typeface="Gautami"/>
-        <a:font script="Taml" typeface="Latha"/>
-        <a:font script="Syrc" typeface="Estrangelo Edessa"/>
-        <a:font script="Orya" typeface="Kalinga"/>
-        <a:font script="Mlym" typeface="Kartika"/>
-        <a:font script="Laoo" typeface="DokChampa"/>
-        <a:font script="Sinh" typeface="Iskoola Pota"/>
-        <a:font script="Mong" typeface="Mongolian Baiti"/>
-        <a:font script="Viet" typeface="Times New Roman"/>
-        <a:font script="Uigh" typeface="Microsoft Uighur"/>
-        <a:font script="Geor" typeface="Sylfaen"/>
-      </a:majorFont>
-      <a:minorFont>
-        <a:latin typeface="Arial"/>
-        <a:ea typeface=""/>
-        <a:cs typeface=""/>
-        <a:font script="Jpan" typeface="ＭＳ Ｐゴシック"/>
-        <a:font script="Hang" typeface="맑은 고딕"/>
-        <a:font script="Hans" typeface="宋体"/>
-        <a:font script="Hant" typeface="新細明體"/>
-        <a:font script="Arab" typeface="Arial"/>
-        <a:font script="Hebr" typeface="Arial"/>
-        <a:font script="Thai" typeface="Cordia New"/>
-        <a:font script="Ethi" typeface="Nyala"/>
-        <a:font script="Beng" typeface="Vrinda"/>
-        <a:font script="Gujr" typeface="Shruti"/>
-        <a:font script="Khmr" typeface="DaunPenh"/>
-        <a:font script="Knda" typeface="Tunga"/>
-        <a:font script="Guru" typeface="Raavi"/>
-        <a:font script="Cans" typeface="Euphemia"/>
-        <a:font script="Cher" typeface="Plantagenet Cherokee"/>
-        <a:font script="Yiii" typeface="Microsoft Yi Baiti"/>
-        <a:font script="Tibt" typeface="Microsoft Himalaya"/>
-        <a:font script="Thaa" typeface="MV Boli"/>
-        <a:font script="Deva" typeface="Mangal"/>
-        <a:font script="Telu" typeface="Gautami"/>
-        <a:font script="Taml" typeface="Latha"/>
-        <a:font script="Syrc" typeface="Estrangelo Edessa"/>
-        <a:font script="Orya" typeface="Kalinga"/>
-        <a:font script="Mlym" typeface="Kartika"/>
-        <a:font script="Laoo" typeface="DokChampa"/>
-        <a:font script="Sinh" typeface="Iskoola Pota"/>
-        <a:font script="Mong" typeface="Mongolian Baiti"/>
-        <a:font script="Viet" typeface="Arial"/>
-        <a:font script="Uigh" typeface="Microsoft Uighur"/>
-        <a:font script="Geor" typeface="Sylfaen"/>
-      </a:minorFont>
-    </a:fontScheme>
-    <a:fmtScheme name="Office">
-      <a:fillStyleLst>
-        <a:solidFill>
-          <a:schemeClr val="phClr"/>
-        </a:solidFill>
-        <a:gradFill rotWithShape="1">
-          <a:gsLst>
-            <a:gs pos="0">
-              <a:schemeClr val="phClr">
-                <a:tint val="50000"/>
-                <a:satMod val="300000"/>
-              </a:schemeClr>
-            </a:gs>
-            <a:gs pos="35000">
-              <a:schemeClr val="phClr">
-                <a:tint val="37000"/>
-                <a:satMod val="300000"/>
-              </a:schemeClr>
-            </a:gs>
-            <a:gs pos="100000">
-              <a:schemeClr val="phClr">
-                <a:tint val="15000"/>
-                <a:satMod val="350000"/>
-              </a:schemeClr>
-            </a:gs>
-          </a:gsLst>
-          <a:lin ang="16200000" scaled="1"/>
-        </a:gradFill>
-        <a:gradFill rotWithShape="1">
-          <a:gsLst>
-            <a:gs pos="0">
-              <a:schemeClr val="phClr">
-                <a:tint val="100000"/>
-                <a:shade val="100000"/>
-                <a:satMod val="130000"/>
-              </a:schemeClr>
-            </a:gs>
-            <a:gs pos="100000">
-              <a:schemeClr val="phClr">
-                <a:tint val="50000"/>
-                <a:shade val="100000"/>
-                <a:satMod val="350000"/>
-              </a:schemeClr>
-            </a:gs>
-          </a:gsLst>
-          <a:lin ang="16200000" scaled="0"/>
-        </a:gradFill>
-      </a:fillStyleLst>
-      <a:lnStyleLst>
-        <a:ln w="9525" cap="flat" cmpd="sng" algn="ctr">
-          <a:solidFill>
-            <a:schemeClr val="phClr">
-              <a:shade val="95000"/>
-              <a:satMod val="105000"/>
-            </a:schemeClr>
-          </a:solidFill>
-          <a:prstDash val="solid"/>
-        </a:ln>
-        <a:ln w="25400" cap="flat" cmpd="sng" algn="ctr">
-          <a:solidFill>
-            <a:schemeClr val="phClr"/>
-          </a:solidFill>
-          <a:prstDash val="solid"/>
-        </a:ln>
-        <a:ln w="38100" cap="flat" cmpd="sng" algn="ctr">
-          <a:solidFill>
-            <a:schemeClr val="phClr"/>
-          </a:solidFill>
-          <a:prstDash val="solid"/>
-        </a:ln>
-      </a:lnStyleLst>
-      <a:effectStyleLst>
-        <a:effectStyle>
-          <a:effectLst>
-            <a:outerShdw blurRad="40000" dist="20000" dir="5400000" rotWithShape="0">
-              <a:srgbClr val="000000">
-                <a:alpha val="38000"/>
-              </a:srgbClr>
-            </a:outerShdw>
-          </a:effectLst>
-        </a:effectStyle>
-        <a:effectStyle>
-          <a:effectLst>
-            <a:outerShdw blurRad="40000" dist="23000" dir="5400000" rotWithShape="0">
-              <a:srgbClr val="000000">
-                <a:alpha val="35000"/>
-              </a:srgbClr>
-            </a:outerShdw>
-          </a:effectLst>
-        </a:effectStyle>
-        <a:effectStyle>
-          <a:effectLst>
-            <a:outerShdw blurRad="40000" dist="23000" dir="5400000" rotWithShape="0">
-              <a:srgbClr val="000000">
-                <a:alpha val="35000"/>
-              </a:srgbClr>
-            </a:outerShdw>
-          </a:effectLst>
-          <a:scene3d>
-            <a:camera prst="orthographicFront">
-              <a:rot lat="0" lon="0" rev="0"/>
-            </a:camera>
-            <a:lightRig rig="threePt" dir="t">
-              <a:rot lat="0" lon="0" rev="1200000"/>
-            </a:lightRig>
-          </a:scene3d>
-          <a:sp3d>
-            <a:bevelT w="63500" h="25400"/>
-          </a:sp3d>
-        </a:effectStyle>
-      </a:effectStyleLst>
-      <a:bgFillStyleLst>
-        <a:solidFill>
-          <a:schemeClr val="phClr"/>
-        </a:solidFill>
-        <a:gradFill rotWithShape="1">
-          <a:gsLst>
-            <a:gs pos="0">
-              <a:schemeClr val="phClr">
-                <a:tint val="40000"/>
-                <a:satMod val="350000"/>
-              </a:schemeClr>
-            </a:gs>
-            <a:gs pos="40000">
-              <a:schemeClr val="phClr">
-                <a:tint val="45000"/>
-                <a:shade val="99000"/>
-                <a:satMod val="350000"/>
-              </a:schemeClr>
-            </a:gs>
-            <a:gs pos="100000">
-              <a:schemeClr val="phClr">
-                <a:shade val="20000"/>
-                <a:satMod val="255000"/>
-              </a:schemeClr>
-            </a:gs>
-          </a:gsLst>
-          <a:path path="circle">
-            <a:fillToRect l="50000" t="-80000" r="50000" b="180000"/>
-          </a:path>
-        </a:gradFill>
-        <a:gradFill rotWithShape="1">
-          <a:gsLst>
-            <a:gs pos="0">
-              <a:schemeClr val="phClr">
-                <a:tint val="80000"/>
-                <a:satMod val="300000"/>
-              </a:schemeClr>
-            </a:gs>
-            <a:gs pos="100000">
-              <a:schemeClr val="phClr">
-                <a:shade val="30000"/>
-                <a:satMod val="200000"/>
-              </a:schemeClr>
-            </a:gs>
-          </a:gsLst>
-          <a:path path="circle">
-            <a:fillToRect l="50000" t="50000" r="50000" b="50000"/>
-          </a:path>
-        </a:gradFill>
-      </a:bgFillStyleLst>
-    </a:fmtScheme>
-  </a:themeElements>
-</a:theme>
 </file>
</xml_diff>

<commit_message>
add missing voice samples
</commit_message>
<xml_diff>
--- a/example/test.pptx
+++ b/example/test.pptx
@@ -880,7 +880,7 @@
             </a:pPr>
             <a:r>
               <a:rPr lang="en"/>
-              <a:t>This is slide 1. It contains absolutely nothing.</a:t>
+              <a:t>This is slide number 1, it contains absolutely nothing.</a:t>
             </a:r>
             <a:endParaRPr/>
           </a:p>
@@ -980,7 +980,7 @@
             </a:pPr>
             <a:r>
               <a:rPr lang="en"/>
-              <a:t>This is slide number 2. It at least contains something.</a:t>
+              <a:t>This is slide number 2, it’s not much but it at least contains something.</a:t>
             </a:r>
             <a:endParaRPr/>
           </a:p>
@@ -1080,7 +1080,7 @@
             </a:pPr>
             <a:r>
               <a:rPr lang="en"/>
-              <a:t>Just kidding! I would like to introduce a tool that I created that can generate video from powerpoint, using AI text to speech.</a:t>
+              <a:t>Just kidding, I hope you found that funny! I would like to introduce a tool that I created that can generate video from powerpoint, using AI text to speech.</a:t>
             </a:r>
             <a:endParaRPr/>
           </a:p>
@@ -1113,7 +1113,7 @@
       </p:grpSpPr>
       <p:sp>
         <p:nvSpPr>
-          <p:cNvPr id="75" name="Google Shape;75;g2f29057a0ff_0_49:notes"/>
+          <p:cNvPr id="75" name="Google Shape;75;g2f29057a0ff_0_30:notes"/>
           <p:cNvSpPr/>
           <p:nvPr>
             <p:ph idx="2" type="sldImg"/>
@@ -1148,7 +1148,7 @@
       </p:sp>
       <p:sp>
         <p:nvSpPr>
-          <p:cNvPr id="76" name="Google Shape;76;g2f29057a0ff_0_49:notes"/>
+          <p:cNvPr id="76" name="Google Shape;76;g2f29057a0ff_0_30:notes"/>
           <p:cNvSpPr txBox="1"/>
           <p:nvPr>
             <p:ph idx="1" type="body"/>
@@ -1180,7 +1180,63 @@
             </a:pPr>
             <a:r>
               <a:rPr lang="en"/>
-              <a:t>The code is up on github, you can clone it down and have a play with it.</a:t>
+              <a:t>it was written in Python. </a:t>
+            </a:r>
+            <a:endParaRPr/>
+          </a:p>
+          <a:p>
+            <a:pPr indent="0" lvl="0" marL="0" rtl="0" algn="l">
+              <a:spcBef>
+                <a:spcPts val="0"/>
+              </a:spcBef>
+              <a:spcAft>
+                <a:spcPts val="0"/>
+              </a:spcAft>
+              <a:buNone/>
+            </a:pPr>
+            <a:r>
+              <a:rPr lang="en"/>
+              <a:t>It uses python P P T X to parse powerpoint files and retrieve speaker notes.</a:t>
+            </a:r>
+            <a:endParaRPr/>
+          </a:p>
+          <a:p>
+            <a:pPr indent="0" lvl="0" marL="0" rtl="0" algn="l">
+              <a:spcBef>
+                <a:spcPts val="0"/>
+              </a:spcBef>
+              <a:spcAft>
+                <a:spcPts val="0"/>
+              </a:spcAft>
+              <a:buNone/>
+            </a:pPr>
+            <a:r>
+              <a:rPr lang="en"/>
+              <a:t>PDF to image to generate images from the PDF exported from the powerpoint slide. Note that this requires the package poppler to be installed via homebrew.</a:t>
+            </a:r>
+            <a:endParaRPr/>
+          </a:p>
+          <a:p>
+            <a:pPr indent="0" lvl="0" marL="0" rtl="0" algn="l">
+              <a:spcBef>
+                <a:spcPts val="0"/>
+              </a:spcBef>
+              <a:spcAft>
+                <a:spcPts val="0"/>
+              </a:spcAft>
+              <a:buNone/>
+            </a:pPr>
+            <a:r>
+              <a:rPr lang="en"/>
+              <a:t>It uses coqui A I X T T S 2 to generate speech, and finally, F F M Peg to </a:t>
+            </a:r>
+            <a:r>
+              <a:rPr lang="en"/>
+              <a:t>stitch</a:t>
+            </a:r>
+            <a:r>
+              <a:rPr lang="en"/>
+              <a:t> everything together into a video.</a:t>
             </a:r>
             <a:endParaRPr/>
           </a:p>
@@ -1199,7 +1255,7 @@
   <p:cSld>
     <p:spTree>
       <p:nvGrpSpPr>
-        <p:cNvPr id="81" name="Shape 81"/>
+        <p:cNvPr id="80" name="Shape 80"/>
         <p:cNvGrpSpPr/>
         <p:nvPr/>
       </p:nvGrpSpPr>
@@ -1213,7 +1269,7 @@
       </p:grpSpPr>
       <p:sp>
         <p:nvSpPr>
-          <p:cNvPr id="82" name="Google Shape;82;g2f29057a0ff_0_30:notes"/>
+          <p:cNvPr id="81" name="Google Shape;81;g2f29057a0ff_0_39:notes"/>
           <p:cNvSpPr/>
           <p:nvPr>
             <p:ph idx="2" type="sldImg"/>
@@ -1248,7 +1304,7 @@
       </p:sp>
       <p:sp>
         <p:nvSpPr>
-          <p:cNvPr id="83" name="Google Shape;83;g2f29057a0ff_0_30:notes"/>
+          <p:cNvPr id="82" name="Google Shape;82;g2f29057a0ff_0_39:notes"/>
           <p:cNvSpPr txBox="1"/>
           <p:nvPr>
             <p:ph idx="1" type="body"/>
@@ -1280,7 +1336,7 @@
             </a:pPr>
             <a:r>
               <a:rPr lang="en"/>
-              <a:t>it was written in Python. </a:t>
+              <a:t>Here are the steps on how to use it.</a:t>
             </a:r>
             <a:endParaRPr/>
           </a:p>
@@ -1295,8 +1351,7 @@
               <a:buNone/>
             </a:pPr>
             <a:r>
-              <a:rPr lang="en"/>
-              <a:t>It uses python P P T X to parse powerpoint files and retrieve speaker notes.</a:t>
+              <a:t/>
             </a:r>
             <a:endParaRPr/>
           </a:p>
@@ -1312,7 +1367,15 @@
             </a:pPr>
             <a:r>
               <a:rPr lang="en"/>
-              <a:t>PDF to image to generate images from the PDF exported from the powerpoint slide. Note that this requires the package poppler to be installed via homebrew.</a:t>
+              <a:t>The first step is optional, but I heavily recommend it. Conda is a must have tool when developing in Python. It </a:t>
+            </a:r>
+            <a:r>
+              <a:rPr lang="en"/>
+              <a:t>compartmentalised</a:t>
+            </a:r>
+            <a:r>
+              <a:rPr lang="en"/>
+              <a:t> packages into isolated environments, so your main python environment won’t be polluted.</a:t>
             </a:r>
             <a:endParaRPr/>
           </a:p>
@@ -1327,8 +1390,7 @@
               <a:buNone/>
             </a:pPr>
             <a:r>
-              <a:rPr lang="en"/>
-              <a:t>It uses T T S from coqui A I X T T S 2 to generate speech.</a:t>
+              <a:t/>
             </a:r>
             <a:endParaRPr/>
           </a:p>
@@ -1344,15 +1406,69 @@
             </a:pPr>
             <a:r>
               <a:rPr lang="en"/>
-              <a:t>And finally, F F M Peg to </a:t>
+              <a:t>Step 2 is running pip install, and step 3 is to manually export your powerpoint to PDF. This is needed because the tool cannot convert the powerpoint slide directly to images. There is a way to do it automatically, but you would need libre office installed which I think is overkill. After all, you are already manually creating the powerpoint slide, this is just 1 more manual step.</a:t>
             </a:r>
+            <a:endParaRPr/>
+          </a:p>
+          <a:p>
+            <a:pPr indent="0" lvl="0" marL="0" rtl="0" algn="l">
+              <a:spcBef>
+                <a:spcPts val="0"/>
+              </a:spcBef>
+              <a:spcAft>
+                <a:spcPts val="0"/>
+              </a:spcAft>
+              <a:buNone/>
+            </a:pPr>
+            <a:r>
+              <a:t/>
+            </a:r>
+            <a:endParaRPr/>
+          </a:p>
+          <a:p>
+            <a:pPr indent="0" lvl="0" marL="0" rtl="0" algn="l">
+              <a:spcBef>
+                <a:spcPts val="0"/>
+              </a:spcBef>
+              <a:spcAft>
+                <a:spcPts val="0"/>
+              </a:spcAft>
+              <a:buNone/>
+            </a:pPr>
             <a:r>
               <a:rPr lang="en"/>
-              <a:t>stitch</a:t>
+              <a:t>The next step is to setup the AI voice. I will come back to this in the next slide.</a:t>
             </a:r>
+            <a:endParaRPr/>
+          </a:p>
+          <a:p>
+            <a:pPr indent="0" lvl="0" marL="0" rtl="0" algn="l">
+              <a:spcBef>
+                <a:spcPts val="0"/>
+              </a:spcBef>
+              <a:spcAft>
+                <a:spcPts val="0"/>
+              </a:spcAft>
+              <a:buNone/>
+            </a:pPr>
+            <a:r>
+              <a:t/>
+            </a:r>
+            <a:endParaRPr/>
+          </a:p>
+          <a:p>
+            <a:pPr indent="0" lvl="0" marL="0" rtl="0" algn="l">
+              <a:spcBef>
+                <a:spcPts val="0"/>
+              </a:spcBef>
+              <a:spcAft>
+                <a:spcPts val="0"/>
+              </a:spcAft>
+              <a:buNone/>
+            </a:pPr>
             <a:r>
               <a:rPr lang="en"/>
-              <a:t> everything together into a video.</a:t>
+              <a:t>Finally, you use both the powerpoint file and the PDF as inputs of the tool. The output will be a video, with the voice that you set up in the last step.</a:t>
             </a:r>
             <a:endParaRPr/>
           </a:p>
@@ -1371,7 +1487,7 @@
   <p:cSld>
     <p:spTree>
       <p:nvGrpSpPr>
-        <p:cNvPr id="87" name="Shape 87"/>
+        <p:cNvPr id="86" name="Shape 86"/>
         <p:cNvGrpSpPr/>
         <p:nvPr/>
       </p:nvGrpSpPr>
@@ -1385,7 +1501,7 @@
       </p:grpSpPr>
       <p:sp>
         <p:nvSpPr>
-          <p:cNvPr id="88" name="Google Shape;88;g2f29057a0ff_0_39:notes"/>
+          <p:cNvPr id="87" name="Google Shape;87;g2f29057a0ff_0_59:notes"/>
           <p:cNvSpPr/>
           <p:nvPr>
             <p:ph idx="2" type="sldImg"/>
@@ -1420,7 +1536,7 @@
       </p:sp>
       <p:sp>
         <p:nvSpPr>
-          <p:cNvPr id="89" name="Google Shape;89;g2f29057a0ff_0_39:notes"/>
+          <p:cNvPr id="88" name="Google Shape;88;g2f29057a0ff_0_59:notes"/>
           <p:cNvSpPr txBox="1"/>
           <p:nvPr>
             <p:ph idx="1" type="body"/>
@@ -1452,7 +1568,7 @@
             </a:pPr>
             <a:r>
               <a:rPr lang="en"/>
-              <a:t>Here’s how you use it.</a:t>
+              <a:t>Now, let’s get to the best part, voice cloning. </a:t>
             </a:r>
             <a:endParaRPr/>
           </a:p>
@@ -1468,15 +1584,23 @@
             </a:pPr>
             <a:r>
               <a:rPr lang="en"/>
-              <a:t>The first step is optional, but I will heavily recommend it. Conda is one of the must have tools when developing in Python, it </a:t>
+              <a:t>What you are hearing right now is the output of this AI voice cloning.</a:t>
             </a:r>
+            <a:endParaRPr/>
+          </a:p>
+          <a:p>
+            <a:pPr indent="0" lvl="0" marL="0" rtl="0" algn="l">
+              <a:spcBef>
+                <a:spcPts val="0"/>
+              </a:spcBef>
+              <a:spcAft>
+                <a:spcPts val="0"/>
+              </a:spcAft>
+              <a:buNone/>
+            </a:pPr>
             <a:r>
               <a:rPr lang="en"/>
-              <a:t>compartmentalised</a:t>
-            </a:r>
-            <a:r>
-              <a:rPr lang="en"/>
-              <a:t> packages into isolated environments, so your main python environment won’t be polluted with packages you don’t need.</a:t>
+              <a:t>As I described before, this is using Coqui A I X T T S 2, which is a well known text to speech AI model. And it runs on your computer, no data is sent to Open A I, it’s totally offline.</a:t>
             </a:r>
             <a:endParaRPr/>
           </a:p>
@@ -1507,7 +1631,7 @@
             </a:pPr>
             <a:r>
               <a:rPr lang="en"/>
-              <a:t>Step 2 is running pip install, step 3 is to manually export your powerpoint to PDF. This is needed because the tool cannot convert the powerpoint slide directly to images. There is a way to do it automatically, but you would need libre office installed which I think is overkill. After all, you are already manually creating the powerpoint slide, this is just 1 more manual step.</a:t>
+              <a:t>In the voices folder, there are some sample voices. These are just wave files from 10 to 30 seconds long of someone reading something.</a:t>
             </a:r>
             <a:endParaRPr/>
           </a:p>
@@ -1538,7 +1662,7 @@
             </a:pPr>
             <a:r>
               <a:rPr lang="en"/>
-              <a:t>The next step is to setup the AI voice. I will come back to this in the next slide.</a:t>
+              <a:t>That’s all the AI needs to generate speech!</a:t>
             </a:r>
             <a:endParaRPr/>
           </a:p>
@@ -1569,7 +1693,22 @@
             </a:pPr>
             <a:r>
               <a:rPr lang="en"/>
-              <a:t>Finally, you use both the powerpoint file and the PDF as inputs of the tool. The output will be a video, with the voice that you set up in the last step.</a:t>
+              <a:t>You can record your own voice reading something for 10 20 seconds, swap your voice file in the python script, and voila!</a:t>
+            </a:r>
+            <a:endParaRPr/>
+          </a:p>
+          <a:p>
+            <a:pPr indent="0" lvl="0" marL="0" rtl="0" algn="l">
+              <a:spcBef>
+                <a:spcPts val="0"/>
+              </a:spcBef>
+              <a:spcAft>
+                <a:spcPts val="0"/>
+              </a:spcAft>
+              <a:buNone/>
+            </a:pPr>
+            <a:r>
+              <a:t/>
             </a:r>
             <a:endParaRPr/>
           </a:p>
@@ -1588,7 +1727,7 @@
   <p:cSld>
     <p:spTree>
       <p:nvGrpSpPr>
-        <p:cNvPr id="93" name="Shape 93"/>
+        <p:cNvPr id="94" name="Shape 94"/>
         <p:cNvGrpSpPr/>
         <p:nvPr/>
       </p:nvGrpSpPr>
@@ -1602,7 +1741,7 @@
       </p:grpSpPr>
       <p:sp>
         <p:nvSpPr>
-          <p:cNvPr id="94" name="Google Shape;94;g2f29057a0ff_0_59:notes"/>
+          <p:cNvPr id="95" name="Google Shape;95;g2f29057a0ff_0_49:notes"/>
           <p:cNvSpPr/>
           <p:nvPr>
             <p:ph idx="2" type="sldImg"/>
@@ -1637,7 +1776,7 @@
       </p:sp>
       <p:sp>
         <p:nvSpPr>
-          <p:cNvPr id="95" name="Google Shape;95;g2f29057a0ff_0_59:notes"/>
+          <p:cNvPr id="96" name="Google Shape;96;g2f29057a0ff_0_49:notes"/>
           <p:cNvSpPr txBox="1"/>
           <p:nvPr>
             <p:ph idx="1" type="body"/>
@@ -1669,147 +1808,7 @@
             </a:pPr>
             <a:r>
               <a:rPr lang="en"/>
-              <a:t>Now, let’s get to the best part, voice cloning. </a:t>
-            </a:r>
-            <a:endParaRPr/>
-          </a:p>
-          <a:p>
-            <a:pPr indent="0" lvl="0" marL="0" rtl="0" algn="l">
-              <a:spcBef>
-                <a:spcPts val="0"/>
-              </a:spcBef>
-              <a:spcAft>
-                <a:spcPts val="0"/>
-              </a:spcAft>
-              <a:buNone/>
-            </a:pPr>
-            <a:r>
-              <a:rPr lang="en"/>
-              <a:t>This is wicked cool! What you are hearing right now is the output of this AI voice cloning.</a:t>
-            </a:r>
-            <a:endParaRPr/>
-          </a:p>
-          <a:p>
-            <a:pPr indent="0" lvl="0" marL="0" rtl="0" algn="l">
-              <a:spcBef>
-                <a:spcPts val="0"/>
-              </a:spcBef>
-              <a:spcAft>
-                <a:spcPts val="0"/>
-              </a:spcAft>
-              <a:buNone/>
-            </a:pPr>
-            <a:r>
-              <a:rPr lang="en"/>
-              <a:t>As I described before, this is using Coqui A I X T T S 2, which is a well known text to speech AI model. And it runs on your computer, no data is sent to Open A I, it’s totally offline.</a:t>
-            </a:r>
-            <a:endParaRPr/>
-          </a:p>
-          <a:p>
-            <a:pPr indent="0" lvl="0" marL="0" rtl="0" algn="l">
-              <a:spcBef>
-                <a:spcPts val="0"/>
-              </a:spcBef>
-              <a:spcAft>
-                <a:spcPts val="0"/>
-              </a:spcAft>
-              <a:buNone/>
-            </a:pPr>
-            <a:r>
-              <a:t/>
-            </a:r>
-            <a:endParaRPr/>
-          </a:p>
-          <a:p>
-            <a:pPr indent="0" lvl="0" marL="0" rtl="0" algn="l">
-              <a:spcBef>
-                <a:spcPts val="0"/>
-              </a:spcBef>
-              <a:spcAft>
-                <a:spcPts val="0"/>
-              </a:spcAft>
-              <a:buNone/>
-            </a:pPr>
-            <a:r>
-              <a:rPr lang="en"/>
-              <a:t>In the voices folder, there are some sample voices. These are just wave files from 10 to 30 seconds long of someone reading something.</a:t>
-            </a:r>
-            <a:endParaRPr/>
-          </a:p>
-          <a:p>
-            <a:pPr indent="0" lvl="0" marL="0" rtl="0" algn="l">
-              <a:spcBef>
-                <a:spcPts val="0"/>
-              </a:spcBef>
-              <a:spcAft>
-                <a:spcPts val="0"/>
-              </a:spcAft>
-              <a:buNone/>
-            </a:pPr>
-            <a:r>
-              <a:t/>
-            </a:r>
-            <a:endParaRPr/>
-          </a:p>
-          <a:p>
-            <a:pPr indent="0" lvl="0" marL="0" rtl="0" algn="l">
-              <a:spcBef>
-                <a:spcPts val="0"/>
-              </a:spcBef>
-              <a:spcAft>
-                <a:spcPts val="0"/>
-              </a:spcAft>
-              <a:buNone/>
-            </a:pPr>
-            <a:r>
-              <a:rPr lang="en"/>
-              <a:t>That’s all the AI needs to generate speech!</a:t>
-            </a:r>
-            <a:endParaRPr/>
-          </a:p>
-          <a:p>
-            <a:pPr indent="0" lvl="0" marL="0" rtl="0" algn="l">
-              <a:spcBef>
-                <a:spcPts val="0"/>
-              </a:spcBef>
-              <a:spcAft>
-                <a:spcPts val="0"/>
-              </a:spcAft>
-              <a:buNone/>
-            </a:pPr>
-            <a:r>
-              <a:t/>
-            </a:r>
-            <a:endParaRPr/>
-          </a:p>
-          <a:p>
-            <a:pPr indent="0" lvl="0" marL="0" rtl="0" algn="l">
-              <a:spcBef>
-                <a:spcPts val="0"/>
-              </a:spcBef>
-              <a:spcAft>
-                <a:spcPts val="0"/>
-              </a:spcAft>
-              <a:buNone/>
-            </a:pPr>
-            <a:r>
-              <a:rPr lang="en"/>
-              <a:t>You can record your own voice reading something for 10 20 seconds, swap your voice file in the python script, and voila!</a:t>
-            </a:r>
-            <a:endParaRPr/>
-          </a:p>
-          <a:p>
-            <a:pPr indent="0" lvl="0" marL="0" rtl="0" algn="l">
-              <a:spcBef>
-                <a:spcPts val="0"/>
-              </a:spcBef>
-              <a:spcAft>
-                <a:spcPts val="0"/>
-              </a:spcAft>
-              <a:buNone/>
-            </a:pPr>
-            <a:r>
-              <a:t/>
+              <a:t>The code is up on github, you can clone it down and have a play with it.</a:t>
             </a:r>
             <a:endParaRPr/>
           </a:p>
@@ -7071,50 +7070,109 @@
           </a:bodyPr>
           <a:lstStyle/>
           <a:p>
-            <a:pPr indent="0" lvl="0" marL="0" rtl="0" algn="l">
-              <a:spcBef>
-                <a:spcPts val="0"/>
-              </a:spcBef>
-              <a:spcAft>
-                <a:spcPts val="1200"/>
-              </a:spcAft>
-              <a:buNone/>
+            <a:pPr indent="-342900" lvl="0" marL="457200" rtl="0" algn="l">
+              <a:spcBef>
+                <a:spcPts val="0"/>
+              </a:spcBef>
+              <a:spcAft>
+                <a:spcPts val="0"/>
+              </a:spcAft>
+              <a:buSzPts val="1800"/>
+              <a:buChar char="-"/>
             </a:pPr>
             <a:r>
-              <a:t/>
+              <a:rPr lang="en"/>
+              <a:t>Python				3.11</a:t>
+            </a:r>
+            <a:endParaRPr/>
+          </a:p>
+          <a:p>
+            <a:pPr indent="-342900" lvl="0" marL="457200" rtl="0" algn="l">
+              <a:spcBef>
+                <a:spcPts val="0"/>
+              </a:spcBef>
+              <a:spcAft>
+                <a:spcPts val="0"/>
+              </a:spcAft>
+              <a:buSzPts val="1800"/>
+              <a:buChar char="-"/>
+            </a:pPr>
+            <a:r>
+              <a:rPr lang="en"/>
+              <a:t>Python-pptx			https://python-pptx.readthedocs.io/en/latest/index.html</a:t>
+            </a:r>
+            <a:endParaRPr/>
+          </a:p>
+          <a:p>
+            <a:pPr indent="-342900" lvl="0" marL="457200" rtl="0" algn="l">
+              <a:spcBef>
+                <a:spcPts val="0"/>
+              </a:spcBef>
+              <a:spcAft>
+                <a:spcPts val="0"/>
+              </a:spcAft>
+              <a:buSzPts val="1800"/>
+              <a:buChar char="-"/>
+            </a:pPr>
+            <a:r>
+              <a:rPr lang="en"/>
+              <a:t>Pdf2image			https://pypi.org/project/pdf2image/</a:t>
+            </a:r>
+            <a:endParaRPr/>
+          </a:p>
+          <a:p>
+            <a:pPr indent="-342900" lvl="0" marL="457200" rtl="0" algn="l">
+              <a:spcBef>
+                <a:spcPts val="0"/>
+              </a:spcBef>
+              <a:spcAft>
+                <a:spcPts val="0"/>
+              </a:spcAft>
+              <a:buSzPts val="1800"/>
+              <a:buChar char="-"/>
+            </a:pPr>
+            <a:r>
+              <a:rPr lang="en"/>
+              <a:t>CoquiAI xtts2 		https://github.com/coqui-ai/TTS</a:t>
+            </a:r>
+            <a:endParaRPr/>
+          </a:p>
+          <a:p>
+            <a:pPr indent="-342900" lvl="0" marL="457200" rtl="0" algn="l">
+              <a:spcBef>
+                <a:spcPts val="0"/>
+              </a:spcBef>
+              <a:spcAft>
+                <a:spcPts val="0"/>
+              </a:spcAft>
+              <a:buSzPts val="1800"/>
+              <a:buChar char="-"/>
+            </a:pPr>
+            <a:r>
+              <a:rPr lang="en"/>
+              <a:t>FFMPEG			brew install ffmpeg</a:t>
+            </a:r>
+            <a:endParaRPr/>
+          </a:p>
+          <a:p>
+            <a:pPr indent="-342900" lvl="0" marL="457200" rtl="0" algn="l">
+              <a:spcBef>
+                <a:spcPts val="0"/>
+              </a:spcBef>
+              <a:spcAft>
+                <a:spcPts val="0"/>
+              </a:spcAft>
+              <a:buSzPts val="1800"/>
+              <a:buChar char="-"/>
+            </a:pPr>
+            <a:r>
+              <a:rPr lang="en"/>
+              <a:t>Poppler				brew install poppler</a:t>
             </a:r>
             <a:endParaRPr/>
           </a:p>
         </p:txBody>
       </p:sp>
-      <p:pic>
-        <p:nvPicPr>
-          <p:cNvPr id="80" name="Google Shape;80;p17"/>
-          <p:cNvPicPr preferRelativeResize="0"/>
-          <p:nvPr/>
-        </p:nvPicPr>
-        <p:blipFill>
-          <a:blip r:embed="rId3">
-            <a:alphaModFix/>
-          </a:blip>
-          <a:stretch>
-            <a:fillRect/>
-          </a:stretch>
-        </p:blipFill>
-        <p:spPr>
-          <a:xfrm>
-            <a:off x="407716" y="1152474"/>
-            <a:ext cx="7944457" cy="3702375"/>
-          </a:xfrm>
-          <a:prstGeom prst="rect">
-            <a:avLst/>
-          </a:prstGeom>
-          <a:noFill/>
-          <a:ln>
-            <a:noFill/>
-          </a:ln>
-        </p:spPr>
-      </p:pic>
     </p:spTree>
   </p:cSld>
   <p:clrMapOvr>
@@ -7128,7 +7186,7 @@
   <p:cSld>
     <p:spTree>
       <p:nvGrpSpPr>
-        <p:cNvPr id="84" name="Shape 84"/>
+        <p:cNvPr id="83" name="Shape 83"/>
         <p:cNvGrpSpPr/>
         <p:nvPr/>
       </p:nvGrpSpPr>
@@ -7142,7 +7200,7 @@
       </p:grpSpPr>
       <p:sp>
         <p:nvSpPr>
-          <p:cNvPr id="85" name="Google Shape;85;p18"/>
+          <p:cNvPr id="84" name="Google Shape;84;p18"/>
           <p:cNvSpPr txBox="1"/>
           <p:nvPr>
             <p:ph type="title"/>
@@ -7174,7 +7232,7 @@
             </a:pPr>
             <a:r>
               <a:rPr lang="en"/>
-              <a:t>https://github.com/hoangbv15/local_ai_ppt_presenter</a:t>
+              <a:t>How to use it</a:t>
             </a:r>
             <a:endParaRPr/>
           </a:p>
@@ -7182,7 +7240,245 @@
       </p:sp>
       <p:sp>
         <p:nvSpPr>
-          <p:cNvPr id="86" name="Google Shape;86;p18"/>
+          <p:cNvPr id="85" name="Google Shape;85;p18"/>
+          <p:cNvSpPr txBox="1"/>
+          <p:nvPr>
+            <p:ph idx="1" type="body"/>
+          </p:nvPr>
+        </p:nvSpPr>
+        <p:spPr>
+          <a:xfrm>
+            <a:off x="311700" y="1152475"/>
+            <a:ext cx="8520600" cy="3416400"/>
+          </a:xfrm>
+          <a:prstGeom prst="rect">
+            <a:avLst/>
+          </a:prstGeom>
+        </p:spPr>
+        <p:txBody>
+          <a:bodyPr anchorCtr="0" anchor="t" bIns="91425" lIns="91425" spcFirstLastPara="1" rIns="91425" wrap="square" tIns="91425">
+            <a:normAutofit/>
+          </a:bodyPr>
+          <a:lstStyle/>
+          <a:p>
+            <a:pPr indent="-361950" lvl="0" marL="457200" rtl="0" algn="l">
+              <a:spcBef>
+                <a:spcPts val="0"/>
+              </a:spcBef>
+              <a:spcAft>
+                <a:spcPts val="0"/>
+              </a:spcAft>
+              <a:buSzPts val="2100"/>
+              <a:buChar char="-"/>
+            </a:pPr>
+            <a:r>
+              <a:rPr lang="en" sz="2100"/>
+              <a:t>Step 1 (Optional): </a:t>
+            </a:r>
+            <a:endParaRPr sz="2100"/>
+          </a:p>
+          <a:p>
+            <a:pPr indent="-361950" lvl="1" marL="914400" rtl="0" algn="l">
+              <a:spcBef>
+                <a:spcPts val="0"/>
+              </a:spcBef>
+              <a:spcAft>
+                <a:spcPts val="0"/>
+              </a:spcAft>
+              <a:buSzPts val="2100"/>
+              <a:buChar char="-"/>
+            </a:pPr>
+            <a:r>
+              <a:rPr lang="en" sz="2100"/>
+              <a:t>install </a:t>
+            </a:r>
+            <a:r>
+              <a:rPr lang="en" sz="2100" u="sng">
+                <a:solidFill>
+                  <a:schemeClr val="hlink"/>
+                </a:solidFill>
+                <a:hlinkClick r:id="rId3"/>
+              </a:rPr>
+              <a:t>conda</a:t>
+            </a:r>
+            <a:endParaRPr sz="2100"/>
+          </a:p>
+          <a:p>
+            <a:pPr indent="-361950" lvl="1" marL="914400" rtl="0" algn="l">
+              <a:spcBef>
+                <a:spcPts val="0"/>
+              </a:spcBef>
+              <a:spcAft>
+                <a:spcPts val="0"/>
+              </a:spcAft>
+              <a:buSzPts val="2100"/>
+              <a:buChar char="-"/>
+            </a:pPr>
+            <a:r>
+              <a:rPr lang="en" sz="2100"/>
+              <a:t>conda </a:t>
+            </a:r>
+            <a:r>
+              <a:rPr lang="en" sz="2100"/>
+              <a:t>create -n ppt python=3.11</a:t>
+            </a:r>
+            <a:endParaRPr sz="2100"/>
+          </a:p>
+          <a:p>
+            <a:pPr indent="-361950" lvl="1" marL="914400" rtl="0" algn="l">
+              <a:spcBef>
+                <a:spcPts val="0"/>
+              </a:spcBef>
+              <a:spcAft>
+                <a:spcPts val="0"/>
+              </a:spcAft>
+              <a:buSzPts val="2100"/>
+              <a:buChar char="-"/>
+            </a:pPr>
+            <a:r>
+              <a:rPr lang="en" sz="2100"/>
+              <a:t>conda activate ppt</a:t>
+            </a:r>
+            <a:endParaRPr sz="2100"/>
+          </a:p>
+          <a:p>
+            <a:pPr indent="-361950" lvl="0" marL="457200" rtl="0" algn="l">
+              <a:spcBef>
+                <a:spcPts val="0"/>
+              </a:spcBef>
+              <a:spcAft>
+                <a:spcPts val="0"/>
+              </a:spcAft>
+              <a:buSzPts val="2100"/>
+              <a:buChar char="-"/>
+            </a:pPr>
+            <a:r>
+              <a:rPr lang="en" sz="2100"/>
+              <a:t>Step 2: pip install -r requirements.txt</a:t>
+            </a:r>
+            <a:endParaRPr sz="2100"/>
+          </a:p>
+          <a:p>
+            <a:pPr indent="-361950" lvl="0" marL="457200" rtl="0" algn="l">
+              <a:spcBef>
+                <a:spcPts val="0"/>
+              </a:spcBef>
+              <a:spcAft>
+                <a:spcPts val="0"/>
+              </a:spcAft>
+              <a:buSzPts val="2100"/>
+              <a:buChar char="-"/>
+            </a:pPr>
+            <a:r>
+              <a:rPr lang="en" sz="2100"/>
+              <a:t>Step 3: Export your powerpoint slide to pdf, download both</a:t>
+            </a:r>
+            <a:endParaRPr sz="2100"/>
+          </a:p>
+          <a:p>
+            <a:pPr indent="-361950" lvl="0" marL="457200" rtl="0" algn="l">
+              <a:spcBef>
+                <a:spcPts val="0"/>
+              </a:spcBef>
+              <a:spcAft>
+                <a:spcPts val="0"/>
+              </a:spcAft>
+              <a:buSzPts val="2100"/>
+              <a:buChar char="-"/>
+            </a:pPr>
+            <a:r>
+              <a:rPr lang="en" sz="2100"/>
+              <a:t>Step 4: Setup voice cloning</a:t>
+            </a:r>
+            <a:endParaRPr sz="2100"/>
+          </a:p>
+          <a:p>
+            <a:pPr indent="-361950" lvl="0" marL="457200" rtl="0" algn="l">
+              <a:spcBef>
+                <a:spcPts val="0"/>
+              </a:spcBef>
+              <a:spcAft>
+                <a:spcPts val="0"/>
+              </a:spcAft>
+              <a:buSzPts val="2100"/>
+              <a:buChar char="-"/>
+            </a:pPr>
+            <a:r>
+              <a:rPr lang="en" sz="2100"/>
+              <a:t>Step 5: python main.py --pptx Test.pptx --pdf Test.pdf -o final.mp4</a:t>
+            </a:r>
+            <a:endParaRPr sz="2100"/>
+          </a:p>
+        </p:txBody>
+      </p:sp>
+    </p:spTree>
+  </p:cSld>
+  <p:clrMapOvr>
+    <a:masterClrMapping/>
+  </p:clrMapOvr>
+</p:sld>
+</file>
+
+<file path=ppt/slides/slide7.xml><?xml version="1.0" encoding="utf-8"?>
+<p:sld xmlns:a="http://schemas.openxmlformats.org/drawingml/2006/main" xmlns:r="http://schemas.openxmlformats.org/officeDocument/2006/relationships" xmlns:mc="http://schemas.openxmlformats.org/markup-compatibility/2006" xmlns:mv="urn:schemas-microsoft-com:mac:vml" xmlns:p="http://schemas.openxmlformats.org/presentationml/2006/main" xmlns:c="http://schemas.openxmlformats.org/drawingml/2006/chart" xmlns:dgm="http://schemas.openxmlformats.org/drawingml/2006/diagram" xmlns:o="urn:schemas-microsoft-com:office:office" xmlns:v="urn:schemas-microsoft-com:vml" xmlns:pvml="urn:schemas-microsoft-com:office:powerpoint" xmlns:com="http://schemas.openxmlformats.org/drawingml/2006/compatibility" xmlns:p14="http://schemas.microsoft.com/office/powerpoint/2010/main" xmlns:p15="http://schemas.microsoft.com/office/powerpoint/2012/main" xmlns:ahyp="http://schemas.microsoft.com/office/drawing/2018/hyperlinkcolor">
+  <p:cSld>
+    <p:spTree>
+      <p:nvGrpSpPr>
+        <p:cNvPr id="89" name="Shape 89"/>
+        <p:cNvGrpSpPr/>
+        <p:nvPr/>
+      </p:nvGrpSpPr>
+      <p:grpSpPr>
+        <a:xfrm>
+          <a:off x="0" y="0"/>
+          <a:ext cx="0" cy="0"/>
+          <a:chOff x="0" y="0"/>
+          <a:chExt cx="0" cy="0"/>
+        </a:xfrm>
+      </p:grpSpPr>
+      <p:sp>
+        <p:nvSpPr>
+          <p:cNvPr id="90" name="Google Shape;90;p19"/>
+          <p:cNvSpPr txBox="1"/>
+          <p:nvPr>
+            <p:ph type="title"/>
+          </p:nvPr>
+        </p:nvSpPr>
+        <p:spPr>
+          <a:xfrm>
+            <a:off x="311700" y="445025"/>
+            <a:ext cx="8520600" cy="572700"/>
+          </a:xfrm>
+          <a:prstGeom prst="rect">
+            <a:avLst/>
+          </a:prstGeom>
+        </p:spPr>
+        <p:txBody>
+          <a:bodyPr anchorCtr="0" anchor="t" bIns="91425" lIns="91425" spcFirstLastPara="1" rIns="91425" wrap="square" tIns="91425">
+            <a:normAutofit fontScale="90000"/>
+          </a:bodyPr>
+          <a:lstStyle/>
+          <a:p>
+            <a:pPr indent="0" lvl="0" marL="0" rtl="0" algn="l">
+              <a:spcBef>
+                <a:spcPts val="0"/>
+              </a:spcBef>
+              <a:spcAft>
+                <a:spcPts val="0"/>
+              </a:spcAft>
+              <a:buNone/>
+            </a:pPr>
+            <a:r>
+              <a:rPr lang="en"/>
+              <a:t>Voice cloning</a:t>
+            </a:r>
+            <a:endParaRPr/>
+          </a:p>
+        </p:txBody>
+      </p:sp>
+      <p:sp>
+        <p:nvSpPr>
+          <p:cNvPr id="91" name="Google Shape;91;p19"/>
           <p:cNvSpPr txBox="1"/>
           <p:nvPr>
             <p:ph idx="1" type="body"/>
@@ -7215,435 +7511,6 @@
             </a:pPr>
             <a:r>
               <a:rPr lang="en"/>
-              <a:t>Python				3.11</a:t>
-            </a:r>
-            <a:endParaRPr/>
-          </a:p>
-          <a:p>
-            <a:pPr indent="-342900" lvl="0" marL="457200" rtl="0" algn="l">
-              <a:spcBef>
-                <a:spcPts val="0"/>
-              </a:spcBef>
-              <a:spcAft>
-                <a:spcPts val="0"/>
-              </a:spcAft>
-              <a:buSzPts val="1800"/>
-              <a:buChar char="-"/>
-            </a:pPr>
-            <a:r>
-              <a:rPr lang="en"/>
-              <a:t>Python-pptx			https://python-pptx.readthedocs.io/en/latest/index.html</a:t>
-            </a:r>
-            <a:endParaRPr/>
-          </a:p>
-          <a:p>
-            <a:pPr indent="-342900" lvl="0" marL="457200" rtl="0" algn="l">
-              <a:spcBef>
-                <a:spcPts val="0"/>
-              </a:spcBef>
-              <a:spcAft>
-                <a:spcPts val="0"/>
-              </a:spcAft>
-              <a:buSzPts val="1800"/>
-              <a:buChar char="-"/>
-            </a:pPr>
-            <a:r>
-              <a:rPr lang="en"/>
-              <a:t>Pdf2image			https://pypi.org/project/pdf2image/</a:t>
-            </a:r>
-            <a:endParaRPr/>
-          </a:p>
-          <a:p>
-            <a:pPr indent="-342900" lvl="0" marL="457200" rtl="0" algn="l">
-              <a:spcBef>
-                <a:spcPts val="0"/>
-              </a:spcBef>
-              <a:spcAft>
-                <a:spcPts val="0"/>
-              </a:spcAft>
-              <a:buSzPts val="1800"/>
-              <a:buChar char="-"/>
-            </a:pPr>
-            <a:r>
-              <a:rPr lang="en"/>
-              <a:t>CoquiAI xtts2 		https://github.com/coqui-ai/TTS</a:t>
-            </a:r>
-            <a:endParaRPr/>
-          </a:p>
-          <a:p>
-            <a:pPr indent="-342900" lvl="0" marL="457200" rtl="0" algn="l">
-              <a:spcBef>
-                <a:spcPts val="0"/>
-              </a:spcBef>
-              <a:spcAft>
-                <a:spcPts val="0"/>
-              </a:spcAft>
-              <a:buSzPts val="1800"/>
-              <a:buChar char="-"/>
-            </a:pPr>
-            <a:r>
-              <a:rPr lang="en"/>
-              <a:t>FFMPEG			brew install ffmpeg</a:t>
-            </a:r>
-            <a:endParaRPr/>
-          </a:p>
-          <a:p>
-            <a:pPr indent="-342900" lvl="0" marL="457200" rtl="0" algn="l">
-              <a:spcBef>
-                <a:spcPts val="0"/>
-              </a:spcBef>
-              <a:spcAft>
-                <a:spcPts val="0"/>
-              </a:spcAft>
-              <a:buSzPts val="1800"/>
-              <a:buChar char="-"/>
-            </a:pPr>
-            <a:r>
-              <a:rPr lang="en"/>
-              <a:t>Poppler				brew install poppler</a:t>
-            </a:r>
-            <a:endParaRPr/>
-          </a:p>
-        </p:txBody>
-      </p:sp>
-    </p:spTree>
-  </p:cSld>
-  <p:clrMapOvr>
-    <a:masterClrMapping/>
-  </p:clrMapOvr>
-</p:sld>
-</file>
-
-<file path=ppt/slides/slide7.xml><?xml version="1.0" encoding="utf-8"?>
-<p:sld xmlns:a="http://schemas.openxmlformats.org/drawingml/2006/main" xmlns:r="http://schemas.openxmlformats.org/officeDocument/2006/relationships" xmlns:mc="http://schemas.openxmlformats.org/markup-compatibility/2006" xmlns:mv="urn:schemas-microsoft-com:mac:vml" xmlns:p="http://schemas.openxmlformats.org/presentationml/2006/main" xmlns:c="http://schemas.openxmlformats.org/drawingml/2006/chart" xmlns:dgm="http://schemas.openxmlformats.org/drawingml/2006/diagram" xmlns:o="urn:schemas-microsoft-com:office:office" xmlns:v="urn:schemas-microsoft-com:vml" xmlns:pvml="urn:schemas-microsoft-com:office:powerpoint" xmlns:com="http://schemas.openxmlformats.org/drawingml/2006/compatibility" xmlns:p14="http://schemas.microsoft.com/office/powerpoint/2010/main" xmlns:p15="http://schemas.microsoft.com/office/powerpoint/2012/main" xmlns:ahyp="http://schemas.microsoft.com/office/drawing/2018/hyperlinkcolor">
-  <p:cSld>
-    <p:spTree>
-      <p:nvGrpSpPr>
-        <p:cNvPr id="90" name="Shape 90"/>
-        <p:cNvGrpSpPr/>
-        <p:nvPr/>
-      </p:nvGrpSpPr>
-      <p:grpSpPr>
-        <a:xfrm>
-          <a:off x="0" y="0"/>
-          <a:ext cx="0" cy="0"/>
-          <a:chOff x="0" y="0"/>
-          <a:chExt cx="0" cy="0"/>
-        </a:xfrm>
-      </p:grpSpPr>
-      <p:sp>
-        <p:nvSpPr>
-          <p:cNvPr id="91" name="Google Shape;91;p19"/>
-          <p:cNvSpPr txBox="1"/>
-          <p:nvPr>
-            <p:ph type="title"/>
-          </p:nvPr>
-        </p:nvSpPr>
-        <p:spPr>
-          <a:xfrm>
-            <a:off x="311700" y="445025"/>
-            <a:ext cx="8520600" cy="572700"/>
-          </a:xfrm>
-          <a:prstGeom prst="rect">
-            <a:avLst/>
-          </a:prstGeom>
-        </p:spPr>
-        <p:txBody>
-          <a:bodyPr anchorCtr="0" anchor="t" bIns="91425" lIns="91425" spcFirstLastPara="1" rIns="91425" wrap="square" tIns="91425">
-            <a:normAutofit fontScale="90000"/>
-          </a:bodyPr>
-          <a:lstStyle/>
-          <a:p>
-            <a:pPr indent="0" lvl="0" marL="0" rtl="0" algn="l">
-              <a:spcBef>
-                <a:spcPts val="0"/>
-              </a:spcBef>
-              <a:spcAft>
-                <a:spcPts val="0"/>
-              </a:spcAft>
-              <a:buNone/>
-            </a:pPr>
-            <a:r>
-              <a:rPr lang="en"/>
-              <a:t>How to use it</a:t>
-            </a:r>
-            <a:endParaRPr/>
-          </a:p>
-        </p:txBody>
-      </p:sp>
-      <p:sp>
-        <p:nvSpPr>
-          <p:cNvPr id="92" name="Google Shape;92;p19"/>
-          <p:cNvSpPr txBox="1"/>
-          <p:nvPr>
-            <p:ph idx="1" type="body"/>
-          </p:nvPr>
-        </p:nvSpPr>
-        <p:spPr>
-          <a:xfrm>
-            <a:off x="311700" y="1152475"/>
-            <a:ext cx="8520600" cy="3416400"/>
-          </a:xfrm>
-          <a:prstGeom prst="rect">
-            <a:avLst/>
-          </a:prstGeom>
-        </p:spPr>
-        <p:txBody>
-          <a:bodyPr anchorCtr="0" anchor="t" bIns="91425" lIns="91425" spcFirstLastPara="1" rIns="91425" wrap="square" tIns="91425">
-            <a:normAutofit/>
-          </a:bodyPr>
-          <a:lstStyle/>
-          <a:p>
-            <a:pPr indent="-361950" lvl="0" marL="457200" rtl="0" algn="l">
-              <a:spcBef>
-                <a:spcPts val="0"/>
-              </a:spcBef>
-              <a:spcAft>
-                <a:spcPts val="0"/>
-              </a:spcAft>
-              <a:buSzPts val="2100"/>
-              <a:buChar char="-"/>
-            </a:pPr>
-            <a:r>
-              <a:rPr lang="en" sz="2100"/>
-              <a:t>Step 1 (Optional): </a:t>
-            </a:r>
-            <a:endParaRPr sz="2100"/>
-          </a:p>
-          <a:p>
-            <a:pPr indent="-361950" lvl="1" marL="914400" rtl="0" algn="l">
-              <a:spcBef>
-                <a:spcPts val="0"/>
-              </a:spcBef>
-              <a:spcAft>
-                <a:spcPts val="0"/>
-              </a:spcAft>
-              <a:buSzPts val="2100"/>
-              <a:buChar char="-"/>
-            </a:pPr>
-            <a:r>
-              <a:rPr lang="en" sz="2100"/>
-              <a:t>install </a:t>
-            </a:r>
-            <a:r>
-              <a:rPr lang="en" sz="2100" u="sng">
-                <a:solidFill>
-                  <a:schemeClr val="hlink"/>
-                </a:solidFill>
-                <a:hlinkClick r:id="rId3"/>
-              </a:rPr>
-              <a:t>conda</a:t>
-            </a:r>
-            <a:endParaRPr sz="2100"/>
-          </a:p>
-          <a:p>
-            <a:pPr indent="-361950" lvl="1" marL="914400" rtl="0" algn="l">
-              <a:spcBef>
-                <a:spcPts val="0"/>
-              </a:spcBef>
-              <a:spcAft>
-                <a:spcPts val="0"/>
-              </a:spcAft>
-              <a:buSzPts val="2100"/>
-              <a:buChar char="-"/>
-            </a:pPr>
-            <a:r>
-              <a:rPr lang="en" sz="2100"/>
-              <a:t>conda </a:t>
-            </a:r>
-            <a:r>
-              <a:rPr lang="en" sz="2100"/>
-              <a:t>create -n ppt python=3.11</a:t>
-            </a:r>
-            <a:endParaRPr sz="2100"/>
-          </a:p>
-          <a:p>
-            <a:pPr indent="-361950" lvl="1" marL="914400" rtl="0" algn="l">
-              <a:spcBef>
-                <a:spcPts val="0"/>
-              </a:spcBef>
-              <a:spcAft>
-                <a:spcPts val="0"/>
-              </a:spcAft>
-              <a:buSzPts val="2100"/>
-              <a:buChar char="-"/>
-            </a:pPr>
-            <a:r>
-              <a:rPr lang="en" sz="2100"/>
-              <a:t>conda activate ppt</a:t>
-            </a:r>
-            <a:endParaRPr sz="2100"/>
-          </a:p>
-          <a:p>
-            <a:pPr indent="-361950" lvl="0" marL="457200" rtl="0" algn="l">
-              <a:spcBef>
-                <a:spcPts val="0"/>
-              </a:spcBef>
-              <a:spcAft>
-                <a:spcPts val="0"/>
-              </a:spcAft>
-              <a:buSzPts val="2100"/>
-              <a:buChar char="-"/>
-            </a:pPr>
-            <a:r>
-              <a:rPr lang="en" sz="2100"/>
-              <a:t>Step 2: pip install -r requirements.txt</a:t>
-            </a:r>
-            <a:endParaRPr sz="2100"/>
-          </a:p>
-          <a:p>
-            <a:pPr indent="-361950" lvl="0" marL="457200" rtl="0" algn="l">
-              <a:spcBef>
-                <a:spcPts val="0"/>
-              </a:spcBef>
-              <a:spcAft>
-                <a:spcPts val="0"/>
-              </a:spcAft>
-              <a:buSzPts val="2100"/>
-              <a:buChar char="-"/>
-            </a:pPr>
-            <a:r>
-              <a:rPr lang="en" sz="2100"/>
-              <a:t>Step 3: Export your powerpoint slide to pdf, download both</a:t>
-            </a:r>
-            <a:endParaRPr sz="2100"/>
-          </a:p>
-          <a:p>
-            <a:pPr indent="-361950" lvl="0" marL="457200" rtl="0" algn="l">
-              <a:spcBef>
-                <a:spcPts val="0"/>
-              </a:spcBef>
-              <a:spcAft>
-                <a:spcPts val="0"/>
-              </a:spcAft>
-              <a:buSzPts val="2100"/>
-              <a:buChar char="-"/>
-            </a:pPr>
-            <a:r>
-              <a:rPr lang="en" sz="2100"/>
-              <a:t>Step 4: Setup voice cloning</a:t>
-            </a:r>
-            <a:endParaRPr sz="2100"/>
-          </a:p>
-          <a:p>
-            <a:pPr indent="-361950" lvl="0" marL="457200" rtl="0" algn="l">
-              <a:spcBef>
-                <a:spcPts val="0"/>
-              </a:spcBef>
-              <a:spcAft>
-                <a:spcPts val="0"/>
-              </a:spcAft>
-              <a:buSzPts val="2100"/>
-              <a:buChar char="-"/>
-            </a:pPr>
-            <a:r>
-              <a:rPr lang="en" sz="2100"/>
-              <a:t>Step 5: python main.py --pptx Test.pptx --pdf Test.pdf -o final.mp4</a:t>
-            </a:r>
-            <a:endParaRPr sz="2100"/>
-          </a:p>
-        </p:txBody>
-      </p:sp>
-    </p:spTree>
-  </p:cSld>
-  <p:clrMapOvr>
-    <a:masterClrMapping/>
-  </p:clrMapOvr>
-</p:sld>
-</file>
-
-<file path=ppt/slides/slide8.xml><?xml version="1.0" encoding="utf-8"?>
-<p:sld xmlns:a="http://schemas.openxmlformats.org/drawingml/2006/main" xmlns:r="http://schemas.openxmlformats.org/officeDocument/2006/relationships" xmlns:mc="http://schemas.openxmlformats.org/markup-compatibility/2006" xmlns:mv="urn:schemas-microsoft-com:mac:vml" xmlns:p="http://schemas.openxmlformats.org/presentationml/2006/main" xmlns:c="http://schemas.openxmlformats.org/drawingml/2006/chart" xmlns:dgm="http://schemas.openxmlformats.org/drawingml/2006/diagram" xmlns:o="urn:schemas-microsoft-com:office:office" xmlns:v="urn:schemas-microsoft-com:vml" xmlns:pvml="urn:schemas-microsoft-com:office:powerpoint" xmlns:com="http://schemas.openxmlformats.org/drawingml/2006/compatibility" xmlns:p14="http://schemas.microsoft.com/office/powerpoint/2010/main" xmlns:p15="http://schemas.microsoft.com/office/powerpoint/2012/main" xmlns:ahyp="http://schemas.microsoft.com/office/drawing/2018/hyperlinkcolor">
-  <p:cSld>
-    <p:spTree>
-      <p:nvGrpSpPr>
-        <p:cNvPr id="96" name="Shape 96"/>
-        <p:cNvGrpSpPr/>
-        <p:nvPr/>
-      </p:nvGrpSpPr>
-      <p:grpSpPr>
-        <a:xfrm>
-          <a:off x="0" y="0"/>
-          <a:ext cx="0" cy="0"/>
-          <a:chOff x="0" y="0"/>
-          <a:chExt cx="0" cy="0"/>
-        </a:xfrm>
-      </p:grpSpPr>
-      <p:sp>
-        <p:nvSpPr>
-          <p:cNvPr id="97" name="Google Shape;97;p20"/>
-          <p:cNvSpPr txBox="1"/>
-          <p:nvPr>
-            <p:ph type="title"/>
-          </p:nvPr>
-        </p:nvSpPr>
-        <p:spPr>
-          <a:xfrm>
-            <a:off x="311700" y="445025"/>
-            <a:ext cx="8520600" cy="572700"/>
-          </a:xfrm>
-          <a:prstGeom prst="rect">
-            <a:avLst/>
-          </a:prstGeom>
-        </p:spPr>
-        <p:txBody>
-          <a:bodyPr anchorCtr="0" anchor="t" bIns="91425" lIns="91425" spcFirstLastPara="1" rIns="91425" wrap="square" tIns="91425">
-            <a:normAutofit fontScale="90000"/>
-          </a:bodyPr>
-          <a:lstStyle/>
-          <a:p>
-            <a:pPr indent="0" lvl="0" marL="0" rtl="0" algn="l">
-              <a:spcBef>
-                <a:spcPts val="0"/>
-              </a:spcBef>
-              <a:spcAft>
-                <a:spcPts val="0"/>
-              </a:spcAft>
-              <a:buNone/>
-            </a:pPr>
-            <a:r>
-              <a:rPr lang="en"/>
-              <a:t>Voice cloning</a:t>
-            </a:r>
-            <a:endParaRPr/>
-          </a:p>
-        </p:txBody>
-      </p:sp>
-      <p:sp>
-        <p:nvSpPr>
-          <p:cNvPr id="98" name="Google Shape;98;p20"/>
-          <p:cNvSpPr txBox="1"/>
-          <p:nvPr>
-            <p:ph idx="1" type="body"/>
-          </p:nvPr>
-        </p:nvSpPr>
-        <p:spPr>
-          <a:xfrm>
-            <a:off x="311700" y="1152475"/>
-            <a:ext cx="8520600" cy="3416400"/>
-          </a:xfrm>
-          <a:prstGeom prst="rect">
-            <a:avLst/>
-          </a:prstGeom>
-        </p:spPr>
-        <p:txBody>
-          <a:bodyPr anchorCtr="0" anchor="t" bIns="91425" lIns="91425" spcFirstLastPara="1" rIns="91425" wrap="square" tIns="91425">
-            <a:normAutofit/>
-          </a:bodyPr>
-          <a:lstStyle/>
-          <a:p>
-            <a:pPr indent="-342900" lvl="0" marL="457200" rtl="0" algn="l">
-              <a:spcBef>
-                <a:spcPts val="0"/>
-              </a:spcBef>
-              <a:spcAft>
-                <a:spcPts val="0"/>
-              </a:spcAft>
-              <a:buSzPts val="1800"/>
-              <a:buChar char="-"/>
-            </a:pPr>
-            <a:r>
-              <a:rPr lang="en"/>
               <a:t>This is cool!</a:t>
             </a:r>
             <a:endParaRPr/>
@@ -7711,7 +7578,7 @@
       </p:sp>
       <p:pic>
         <p:nvPicPr>
-          <p:cNvPr id="99" name="Google Shape;99;p20"/>
+          <p:cNvPr id="92" name="Google Shape;92;p19"/>
           <p:cNvPicPr preferRelativeResize="0"/>
           <p:nvPr/>
         </p:nvPicPr>
@@ -7739,7 +7606,7 @@
       </p:pic>
       <p:pic>
         <p:nvPicPr>
-          <p:cNvPr id="100" name="Google Shape;100;p20"/>
+          <p:cNvPr id="93" name="Google Shape;93;p19"/>
           <p:cNvPicPr preferRelativeResize="0"/>
           <p:nvPr/>
         </p:nvPicPr>
@@ -7755,6 +7622,138 @@
           <a:xfrm>
             <a:off x="644650" y="2571750"/>
             <a:ext cx="4512575" cy="442700"/>
+          </a:xfrm>
+          <a:prstGeom prst="rect">
+            <a:avLst/>
+          </a:prstGeom>
+          <a:noFill/>
+          <a:ln>
+            <a:noFill/>
+          </a:ln>
+        </p:spPr>
+      </p:pic>
+    </p:spTree>
+  </p:cSld>
+  <p:clrMapOvr>
+    <a:masterClrMapping/>
+  </p:clrMapOvr>
+</p:sld>
+</file>
+
+<file path=ppt/slides/slide8.xml><?xml version="1.0" encoding="utf-8"?>
+<p:sld xmlns:a="http://schemas.openxmlformats.org/drawingml/2006/main" xmlns:r="http://schemas.openxmlformats.org/officeDocument/2006/relationships" xmlns:mc="http://schemas.openxmlformats.org/markup-compatibility/2006" xmlns:mv="urn:schemas-microsoft-com:mac:vml" xmlns:p="http://schemas.openxmlformats.org/presentationml/2006/main" xmlns:c="http://schemas.openxmlformats.org/drawingml/2006/chart" xmlns:dgm="http://schemas.openxmlformats.org/drawingml/2006/diagram" xmlns:o="urn:schemas-microsoft-com:office:office" xmlns:v="urn:schemas-microsoft-com:vml" xmlns:pvml="urn:schemas-microsoft-com:office:powerpoint" xmlns:com="http://schemas.openxmlformats.org/drawingml/2006/compatibility" xmlns:p14="http://schemas.microsoft.com/office/powerpoint/2010/main" xmlns:p15="http://schemas.microsoft.com/office/powerpoint/2012/main" xmlns:ahyp="http://schemas.microsoft.com/office/drawing/2018/hyperlinkcolor">
+  <p:cSld>
+    <p:spTree>
+      <p:nvGrpSpPr>
+        <p:cNvPr id="97" name="Shape 97"/>
+        <p:cNvGrpSpPr/>
+        <p:nvPr/>
+      </p:nvGrpSpPr>
+      <p:grpSpPr>
+        <a:xfrm>
+          <a:off x="0" y="0"/>
+          <a:ext cx="0" cy="0"/>
+          <a:chOff x="0" y="0"/>
+          <a:chExt cx="0" cy="0"/>
+        </a:xfrm>
+      </p:grpSpPr>
+      <p:sp>
+        <p:nvSpPr>
+          <p:cNvPr id="98" name="Google Shape;98;p20"/>
+          <p:cNvSpPr txBox="1"/>
+          <p:nvPr>
+            <p:ph type="title"/>
+          </p:nvPr>
+        </p:nvSpPr>
+        <p:spPr>
+          <a:xfrm>
+            <a:off x="311700" y="445025"/>
+            <a:ext cx="8520600" cy="572700"/>
+          </a:xfrm>
+          <a:prstGeom prst="rect">
+            <a:avLst/>
+          </a:prstGeom>
+        </p:spPr>
+        <p:txBody>
+          <a:bodyPr anchorCtr="0" anchor="t" bIns="91425" lIns="91425" spcFirstLastPara="1" rIns="91425" wrap="square" tIns="91425">
+            <a:normAutofit fontScale="90000"/>
+          </a:bodyPr>
+          <a:lstStyle/>
+          <a:p>
+            <a:pPr indent="0" lvl="0" marL="0" rtl="0" algn="l">
+              <a:spcBef>
+                <a:spcPts val="0"/>
+              </a:spcBef>
+              <a:spcAft>
+                <a:spcPts val="0"/>
+              </a:spcAft>
+              <a:buNone/>
+            </a:pPr>
+            <a:r>
+              <a:rPr lang="en"/>
+              <a:t>https://github.com/hoangbv15/local_ai_ppt_presenter</a:t>
+            </a:r>
+            <a:endParaRPr/>
+          </a:p>
+        </p:txBody>
+      </p:sp>
+      <p:sp>
+        <p:nvSpPr>
+          <p:cNvPr id="99" name="Google Shape;99;p20"/>
+          <p:cNvSpPr txBox="1"/>
+          <p:nvPr>
+            <p:ph idx="1" type="body"/>
+          </p:nvPr>
+        </p:nvSpPr>
+        <p:spPr>
+          <a:xfrm>
+            <a:off x="311700" y="1152475"/>
+            <a:ext cx="8520600" cy="3416400"/>
+          </a:xfrm>
+          <a:prstGeom prst="rect">
+            <a:avLst/>
+          </a:prstGeom>
+        </p:spPr>
+        <p:txBody>
+          <a:bodyPr anchorCtr="0" anchor="t" bIns="91425" lIns="91425" spcFirstLastPara="1" rIns="91425" wrap="square" tIns="91425">
+            <a:normAutofit/>
+          </a:bodyPr>
+          <a:lstStyle/>
+          <a:p>
+            <a:pPr indent="0" lvl="0" marL="0" rtl="0" algn="l">
+              <a:spcBef>
+                <a:spcPts val="0"/>
+              </a:spcBef>
+              <a:spcAft>
+                <a:spcPts val="1200"/>
+              </a:spcAft>
+              <a:buNone/>
+            </a:pPr>
+            <a:r>
+              <a:t/>
+            </a:r>
+            <a:endParaRPr/>
+          </a:p>
+        </p:txBody>
+      </p:sp>
+      <p:pic>
+        <p:nvPicPr>
+          <p:cNvPr id="100" name="Google Shape;100;p20"/>
+          <p:cNvPicPr preferRelativeResize="0"/>
+          <p:nvPr/>
+        </p:nvPicPr>
+        <p:blipFill>
+          <a:blip r:embed="rId3">
+            <a:alphaModFix/>
+          </a:blip>
+          <a:stretch>
+            <a:fillRect/>
+          </a:stretch>
+        </p:blipFill>
+        <p:spPr>
+          <a:xfrm>
+            <a:off x="407716" y="1152474"/>
+            <a:ext cx="7944457" cy="3702375"/>
           </a:xfrm>
           <a:prstGeom prst="rect">
             <a:avLst/>
@@ -7878,6 +7877,285 @@
 </file>
 
 <file path=ppt/theme/theme1.xml><?xml version="1.0" encoding="utf-8"?>
+<a:theme xmlns:a="http://schemas.openxmlformats.org/drawingml/2006/main" xmlns:r="http://schemas.openxmlformats.org/officeDocument/2006/relationships" name="Simple Light">
+  <a:themeElements>
+    <a:clrScheme name="Simple Light">
+      <a:dk1>
+        <a:srgbClr val="000000"/>
+      </a:dk1>
+      <a:lt1>
+        <a:srgbClr val="FFFFFF"/>
+      </a:lt1>
+      <a:dk2>
+        <a:srgbClr val="595959"/>
+      </a:dk2>
+      <a:lt2>
+        <a:srgbClr val="EEEEEE"/>
+      </a:lt2>
+      <a:accent1>
+        <a:srgbClr val="4285F4"/>
+      </a:accent1>
+      <a:accent2>
+        <a:srgbClr val="212121"/>
+      </a:accent2>
+      <a:accent3>
+        <a:srgbClr val="78909C"/>
+      </a:accent3>
+      <a:accent4>
+        <a:srgbClr val="FFAB40"/>
+      </a:accent4>
+      <a:accent5>
+        <a:srgbClr val="0097A7"/>
+      </a:accent5>
+      <a:accent6>
+        <a:srgbClr val="EEFF41"/>
+      </a:accent6>
+      <a:hlink>
+        <a:srgbClr val="0097A7"/>
+      </a:hlink>
+      <a:folHlink>
+        <a:srgbClr val="0097A7"/>
+      </a:folHlink>
+    </a:clrScheme>
+    <a:fontScheme name="Office">
+      <a:majorFont>
+        <a:latin typeface="Arial"/>
+        <a:ea typeface=""/>
+        <a:cs typeface=""/>
+        <a:font script="Jpan" typeface="ＭＳ Ｐゴシック"/>
+        <a:font script="Hang" typeface="맑은 고딕"/>
+        <a:font script="Hans" typeface="宋体"/>
+        <a:font script="Hant" typeface="新細明體"/>
+        <a:font script="Arab" typeface="Times New Roman"/>
+        <a:font script="Hebr" typeface="Times New Roman"/>
+        <a:font script="Thai" typeface="Angsana New"/>
+        <a:font script="Ethi" typeface="Nyala"/>
+        <a:font script="Beng" typeface="Vrinda"/>
+        <a:font script="Gujr" typeface="Shruti"/>
+        <a:font script="Khmr" typeface="MoolBoran"/>
+        <a:font script="Knda" typeface="Tunga"/>
+        <a:font script="Guru" typeface="Raavi"/>
+        <a:font script="Cans" typeface="Euphemia"/>
+        <a:font script="Cher" typeface="Plantagenet Cherokee"/>
+        <a:font script="Yiii" typeface="Microsoft Yi Baiti"/>
+        <a:font script="Tibt" typeface="Microsoft Himalaya"/>
+        <a:font script="Thaa" typeface="MV Boli"/>
+        <a:font script="Deva" typeface="Mangal"/>
+        <a:font script="Telu" typeface="Gautami"/>
+        <a:font script="Taml" typeface="Latha"/>
+        <a:font script="Syrc" typeface="Estrangelo Edessa"/>
+        <a:font script="Orya" typeface="Kalinga"/>
+        <a:font script="Mlym" typeface="Kartika"/>
+        <a:font script="Laoo" typeface="DokChampa"/>
+        <a:font script="Sinh" typeface="Iskoola Pota"/>
+        <a:font script="Mong" typeface="Mongolian Baiti"/>
+        <a:font script="Viet" typeface="Times New Roman"/>
+        <a:font script="Uigh" typeface="Microsoft Uighur"/>
+        <a:font script="Geor" typeface="Sylfaen"/>
+      </a:majorFont>
+      <a:minorFont>
+        <a:latin typeface="Arial"/>
+        <a:ea typeface=""/>
+        <a:cs typeface=""/>
+        <a:font script="Jpan" typeface="ＭＳ Ｐゴシック"/>
+        <a:font script="Hang" typeface="맑은 고딕"/>
+        <a:font script="Hans" typeface="宋体"/>
+        <a:font script="Hant" typeface="新細明體"/>
+        <a:font script="Arab" typeface="Arial"/>
+        <a:font script="Hebr" typeface="Arial"/>
+        <a:font script="Thai" typeface="Cordia New"/>
+        <a:font script="Ethi" typeface="Nyala"/>
+        <a:font script="Beng" typeface="Vrinda"/>
+        <a:font script="Gujr" typeface="Shruti"/>
+        <a:font script="Khmr" typeface="DaunPenh"/>
+        <a:font script="Knda" typeface="Tunga"/>
+        <a:font script="Guru" typeface="Raavi"/>
+        <a:font script="Cans" typeface="Euphemia"/>
+        <a:font script="Cher" typeface="Plantagenet Cherokee"/>
+        <a:font script="Yiii" typeface="Microsoft Yi Baiti"/>
+        <a:font script="Tibt" typeface="Microsoft Himalaya"/>
+        <a:font script="Thaa" typeface="MV Boli"/>
+        <a:font script="Deva" typeface="Mangal"/>
+        <a:font script="Telu" typeface="Gautami"/>
+        <a:font script="Taml" typeface="Latha"/>
+        <a:font script="Syrc" typeface="Estrangelo Edessa"/>
+        <a:font script="Orya" typeface="Kalinga"/>
+        <a:font script="Mlym" typeface="Kartika"/>
+        <a:font script="Laoo" typeface="DokChampa"/>
+        <a:font script="Sinh" typeface="Iskoola Pota"/>
+        <a:font script="Mong" typeface="Mongolian Baiti"/>
+        <a:font script="Viet" typeface="Arial"/>
+        <a:font script="Uigh" typeface="Microsoft Uighur"/>
+        <a:font script="Geor" typeface="Sylfaen"/>
+      </a:minorFont>
+    </a:fontScheme>
+    <a:fmtScheme name="Office">
+      <a:fillStyleLst>
+        <a:solidFill>
+          <a:schemeClr val="phClr"/>
+        </a:solidFill>
+        <a:gradFill rotWithShape="1">
+          <a:gsLst>
+            <a:gs pos="0">
+              <a:schemeClr val="phClr">
+                <a:tint val="50000"/>
+                <a:satMod val="300000"/>
+              </a:schemeClr>
+            </a:gs>
+            <a:gs pos="35000">
+              <a:schemeClr val="phClr">
+                <a:tint val="37000"/>
+                <a:satMod val="300000"/>
+              </a:schemeClr>
+            </a:gs>
+            <a:gs pos="100000">
+              <a:schemeClr val="phClr">
+                <a:tint val="15000"/>
+                <a:satMod val="350000"/>
+              </a:schemeClr>
+            </a:gs>
+          </a:gsLst>
+          <a:lin ang="16200000" scaled="1"/>
+        </a:gradFill>
+        <a:gradFill rotWithShape="1">
+          <a:gsLst>
+            <a:gs pos="0">
+              <a:schemeClr val="phClr">
+                <a:tint val="100000"/>
+                <a:shade val="100000"/>
+                <a:satMod val="130000"/>
+              </a:schemeClr>
+            </a:gs>
+            <a:gs pos="100000">
+              <a:schemeClr val="phClr">
+                <a:tint val="50000"/>
+                <a:shade val="100000"/>
+                <a:satMod val="350000"/>
+              </a:schemeClr>
+            </a:gs>
+          </a:gsLst>
+          <a:lin ang="16200000" scaled="0"/>
+        </a:gradFill>
+      </a:fillStyleLst>
+      <a:lnStyleLst>
+        <a:ln w="9525" cap="flat" cmpd="sng" algn="ctr">
+          <a:solidFill>
+            <a:schemeClr val="phClr">
+              <a:shade val="95000"/>
+              <a:satMod val="105000"/>
+            </a:schemeClr>
+          </a:solidFill>
+          <a:prstDash val="solid"/>
+        </a:ln>
+        <a:ln w="25400" cap="flat" cmpd="sng" algn="ctr">
+          <a:solidFill>
+            <a:schemeClr val="phClr"/>
+          </a:solidFill>
+          <a:prstDash val="solid"/>
+        </a:ln>
+        <a:ln w="38100" cap="flat" cmpd="sng" algn="ctr">
+          <a:solidFill>
+            <a:schemeClr val="phClr"/>
+          </a:solidFill>
+          <a:prstDash val="solid"/>
+        </a:ln>
+      </a:lnStyleLst>
+      <a:effectStyleLst>
+        <a:effectStyle>
+          <a:effectLst>
+            <a:outerShdw blurRad="40000" dist="20000" dir="5400000" rotWithShape="0">
+              <a:srgbClr val="000000">
+                <a:alpha val="38000"/>
+              </a:srgbClr>
+            </a:outerShdw>
+          </a:effectLst>
+        </a:effectStyle>
+        <a:effectStyle>
+          <a:effectLst>
+            <a:outerShdw blurRad="40000" dist="23000" dir="5400000" rotWithShape="0">
+              <a:srgbClr val="000000">
+                <a:alpha val="35000"/>
+              </a:srgbClr>
+            </a:outerShdw>
+          </a:effectLst>
+        </a:effectStyle>
+        <a:effectStyle>
+          <a:effectLst>
+            <a:outerShdw blurRad="40000" dist="23000" dir="5400000" rotWithShape="0">
+              <a:srgbClr val="000000">
+                <a:alpha val="35000"/>
+              </a:srgbClr>
+            </a:outerShdw>
+          </a:effectLst>
+          <a:scene3d>
+            <a:camera prst="orthographicFront">
+              <a:rot lat="0" lon="0" rev="0"/>
+            </a:camera>
+            <a:lightRig rig="threePt" dir="t">
+              <a:rot lat="0" lon="0" rev="1200000"/>
+            </a:lightRig>
+          </a:scene3d>
+          <a:sp3d>
+            <a:bevelT w="63500" h="25400"/>
+          </a:sp3d>
+        </a:effectStyle>
+      </a:effectStyleLst>
+      <a:bgFillStyleLst>
+        <a:solidFill>
+          <a:schemeClr val="phClr"/>
+        </a:solidFill>
+        <a:gradFill rotWithShape="1">
+          <a:gsLst>
+            <a:gs pos="0">
+              <a:schemeClr val="phClr">
+                <a:tint val="40000"/>
+                <a:satMod val="350000"/>
+              </a:schemeClr>
+            </a:gs>
+            <a:gs pos="40000">
+              <a:schemeClr val="phClr">
+                <a:tint val="45000"/>
+                <a:shade val="99000"/>
+                <a:satMod val="350000"/>
+              </a:schemeClr>
+            </a:gs>
+            <a:gs pos="100000">
+              <a:schemeClr val="phClr">
+                <a:shade val="20000"/>
+                <a:satMod val="255000"/>
+              </a:schemeClr>
+            </a:gs>
+          </a:gsLst>
+          <a:path path="circle">
+            <a:fillToRect l="50000" t="-80000" r="50000" b="180000"/>
+          </a:path>
+        </a:gradFill>
+        <a:gradFill rotWithShape="1">
+          <a:gsLst>
+            <a:gs pos="0">
+              <a:schemeClr val="phClr">
+                <a:tint val="80000"/>
+                <a:satMod val="300000"/>
+              </a:schemeClr>
+            </a:gs>
+            <a:gs pos="100000">
+              <a:schemeClr val="phClr">
+                <a:shade val="30000"/>
+                <a:satMod val="200000"/>
+              </a:schemeClr>
+            </a:gs>
+          </a:gsLst>
+          <a:path path="circle">
+            <a:fillToRect l="50000" t="50000" r="50000" b="50000"/>
+          </a:path>
+        </a:gradFill>
+      </a:bgFillStyleLst>
+    </a:fmtScheme>
+  </a:themeElements>
+</a:theme>
+</file>
+
+<file path=ppt/theme/theme2.xml><?xml version="1.0" encoding="utf-8"?>
 <a:theme xmlns:a="http://schemas.openxmlformats.org/drawingml/2006/main" xmlns:r="http://schemas.openxmlformats.org/officeDocument/2006/relationships">
   <a:themeElements>
     <a:clrScheme name="Default">
@@ -8154,283 +8432,4 @@
     </a:fmtScheme>
   </a:themeElements>
 </a:theme>
-</file>
-
-<file path=ppt/theme/theme2.xml><?xml version="1.0" encoding="utf-8"?>
-<a:theme xmlns:a="http://schemas.openxmlformats.org/drawingml/2006/main" xmlns:r="http://schemas.openxmlformats.org/officeDocument/2006/relationships" name="Simple Light">
-  <a:themeElements>
-    <a:clrScheme name="Simple Light">
-      <a:dk1>
-        <a:srgbClr val="000000"/>
-      </a:dk1>
-      <a:lt1>
-        <a:srgbClr val="FFFFFF"/>
-      </a:lt1>
-      <a:dk2>
-        <a:srgbClr val="595959"/>
-      </a:dk2>
-      <a:lt2>
-        <a:srgbClr val="EEEEEE"/>
-      </a:lt2>
-      <a:accent1>
-        <a:srgbClr val="4285F4"/>
-      </a:accent1>
-      <a:accent2>
-        <a:srgbClr val="212121"/>
-      </a:accent2>
-      <a:accent3>
-        <a:srgbClr val="78909C"/>
-      </a:accent3>
-      <a:accent4>
-        <a:srgbClr val="FFAB40"/>
-      </a:accent4>
-      <a:accent5>
-        <a:srgbClr val="0097A7"/>
-      </a:accent5>
-      <a:accent6>
-        <a:srgbClr val="EEFF41"/>
-      </a:accent6>
-      <a:hlink>
-        <a:srgbClr val="0097A7"/>
-      </a:hlink>
-      <a:folHlink>
-        <a:srgbClr val="0097A7"/>
-      </a:folHlink>
-    </a:clrScheme>
-    <a:fontScheme name="Office">
-      <a:majorFont>
-        <a:latin typeface="Arial"/>
-        <a:ea typeface=""/>
-        <a:cs typeface=""/>
-        <a:font script="Jpan" typeface="ＭＳ Ｐゴシック"/>
-        <a:font script="Hang" typeface="맑은 고딕"/>
-        <a:font script="Hans" typeface="宋体"/>
-        <a:font script="Hant" typeface="新細明體"/>
-        <a:font script="Arab" typeface="Times New Roman"/>
-        <a:font script="Hebr" typeface="Times New Roman"/>
-        <a:font script="Thai" typeface="Angsana New"/>
-        <a:font script="Ethi" typeface="Nyala"/>
-        <a:font script="Beng" typeface="Vrinda"/>
-        <a:font script="Gujr" typeface="Shruti"/>
-        <a:font script="Khmr" typeface="MoolBoran"/>
-        <a:font script="Knda" typeface="Tunga"/>
-        <a:font script="Guru" typeface="Raavi"/>
-        <a:font script="Cans" typeface="Euphemia"/>
-        <a:font script="Cher" typeface="Plantagenet Cherokee"/>
-        <a:font script="Yiii" typeface="Microsoft Yi Baiti"/>
-        <a:font script="Tibt" typeface="Microsoft Himalaya"/>
-        <a:font script="Thaa" typeface="MV Boli"/>
-        <a:font script="Deva" typeface="Mangal"/>
-        <a:font script="Telu" typeface="Gautami"/>
-        <a:font script="Taml" typeface="Latha"/>
-        <a:font script="Syrc" typeface="Estrangelo Edessa"/>
-        <a:font script="Orya" typeface="Kalinga"/>
-        <a:font script="Mlym" typeface="Kartika"/>
-        <a:font script="Laoo" typeface="DokChampa"/>
-        <a:font script="Sinh" typeface="Iskoola Pota"/>
-        <a:font script="Mong" typeface="Mongolian Baiti"/>
-        <a:font script="Viet" typeface="Times New Roman"/>
-        <a:font script="Uigh" typeface="Microsoft Uighur"/>
-        <a:font script="Geor" typeface="Sylfaen"/>
-      </a:majorFont>
-      <a:minorFont>
-        <a:latin typeface="Arial"/>
-        <a:ea typeface=""/>
-        <a:cs typeface=""/>
-        <a:font script="Jpan" typeface="ＭＳ Ｐゴシック"/>
-        <a:font script="Hang" typeface="맑은 고딕"/>
-        <a:font script="Hans" typeface="宋体"/>
-        <a:font script="Hant" typeface="新細明體"/>
-        <a:font script="Arab" typeface="Arial"/>
-        <a:font script="Hebr" typeface="Arial"/>
-        <a:font script="Thai" typeface="Cordia New"/>
-        <a:font script="Ethi" typeface="Nyala"/>
-        <a:font script="Beng" typeface="Vrinda"/>
-        <a:font script="Gujr" typeface="Shruti"/>
-        <a:font script="Khmr" typeface="DaunPenh"/>
-        <a:font script="Knda" typeface="Tunga"/>
-        <a:font script="Guru" typeface="Raavi"/>
-        <a:font script="Cans" typeface="Euphemia"/>
-        <a:font script="Cher" typeface="Plantagenet Cherokee"/>
-        <a:font script="Yiii" typeface="Microsoft Yi Baiti"/>
-        <a:font script="Tibt" typeface="Microsoft Himalaya"/>
-        <a:font script="Thaa" typeface="MV Boli"/>
-        <a:font script="Deva" typeface="Mangal"/>
-        <a:font script="Telu" typeface="Gautami"/>
-        <a:font script="Taml" typeface="Latha"/>
-        <a:font script="Syrc" typeface="Estrangelo Edessa"/>
-        <a:font script="Orya" typeface="Kalinga"/>
-        <a:font script="Mlym" typeface="Kartika"/>
-        <a:font script="Laoo" typeface="DokChampa"/>
-        <a:font script="Sinh" typeface="Iskoola Pota"/>
-        <a:font script="Mong" typeface="Mongolian Baiti"/>
-        <a:font script="Viet" typeface="Arial"/>
-        <a:font script="Uigh" typeface="Microsoft Uighur"/>
-        <a:font script="Geor" typeface="Sylfaen"/>
-      </a:minorFont>
-    </a:fontScheme>
-    <a:fmtScheme name="Office">
-      <a:fillStyleLst>
-        <a:solidFill>
-          <a:schemeClr val="phClr"/>
-        </a:solidFill>
-        <a:gradFill rotWithShape="1">
-          <a:gsLst>
-            <a:gs pos="0">
-              <a:schemeClr val="phClr">
-                <a:tint val="50000"/>
-                <a:satMod val="300000"/>
-              </a:schemeClr>
-            </a:gs>
-            <a:gs pos="35000">
-              <a:schemeClr val="phClr">
-                <a:tint val="37000"/>
-                <a:satMod val="300000"/>
-              </a:schemeClr>
-            </a:gs>
-            <a:gs pos="100000">
-              <a:schemeClr val="phClr">
-                <a:tint val="15000"/>
-                <a:satMod val="350000"/>
-              </a:schemeClr>
-            </a:gs>
-          </a:gsLst>
-          <a:lin ang="16200000" scaled="1"/>
-        </a:gradFill>
-        <a:gradFill rotWithShape="1">
-          <a:gsLst>
-            <a:gs pos="0">
-              <a:schemeClr val="phClr">
-                <a:tint val="100000"/>
-                <a:shade val="100000"/>
-                <a:satMod val="130000"/>
-              </a:schemeClr>
-            </a:gs>
-            <a:gs pos="100000">
-              <a:schemeClr val="phClr">
-                <a:tint val="50000"/>
-                <a:shade val="100000"/>
-                <a:satMod val="350000"/>
-              </a:schemeClr>
-            </a:gs>
-          </a:gsLst>
-          <a:lin ang="16200000" scaled="0"/>
-        </a:gradFill>
-      </a:fillStyleLst>
-      <a:lnStyleLst>
-        <a:ln w="9525" cap="flat" cmpd="sng" algn="ctr">
-          <a:solidFill>
-            <a:schemeClr val="phClr">
-              <a:shade val="95000"/>
-              <a:satMod val="105000"/>
-            </a:schemeClr>
-          </a:solidFill>
-          <a:prstDash val="solid"/>
-        </a:ln>
-        <a:ln w="25400" cap="flat" cmpd="sng" algn="ctr">
-          <a:solidFill>
-            <a:schemeClr val="phClr"/>
-          </a:solidFill>
-          <a:prstDash val="solid"/>
-        </a:ln>
-        <a:ln w="38100" cap="flat" cmpd="sng" algn="ctr">
-          <a:solidFill>
-            <a:schemeClr val="phClr"/>
-          </a:solidFill>
-          <a:prstDash val="solid"/>
-        </a:ln>
-      </a:lnStyleLst>
-      <a:effectStyleLst>
-        <a:effectStyle>
-          <a:effectLst>
-            <a:outerShdw blurRad="40000" dist="20000" dir="5400000" rotWithShape="0">
-              <a:srgbClr val="000000">
-                <a:alpha val="38000"/>
-              </a:srgbClr>
-            </a:outerShdw>
-          </a:effectLst>
-        </a:effectStyle>
-        <a:effectStyle>
-          <a:effectLst>
-            <a:outerShdw blurRad="40000" dist="23000" dir="5400000" rotWithShape="0">
-              <a:srgbClr val="000000">
-                <a:alpha val="35000"/>
-              </a:srgbClr>
-            </a:outerShdw>
-          </a:effectLst>
-        </a:effectStyle>
-        <a:effectStyle>
-          <a:effectLst>
-            <a:outerShdw blurRad="40000" dist="23000" dir="5400000" rotWithShape="0">
-              <a:srgbClr val="000000">
-                <a:alpha val="35000"/>
-              </a:srgbClr>
-            </a:outerShdw>
-          </a:effectLst>
-          <a:scene3d>
-            <a:camera prst="orthographicFront">
-              <a:rot lat="0" lon="0" rev="0"/>
-            </a:camera>
-            <a:lightRig rig="threePt" dir="t">
-              <a:rot lat="0" lon="0" rev="1200000"/>
-            </a:lightRig>
-          </a:scene3d>
-          <a:sp3d>
-            <a:bevelT w="63500" h="25400"/>
-          </a:sp3d>
-        </a:effectStyle>
-      </a:effectStyleLst>
-      <a:bgFillStyleLst>
-        <a:solidFill>
-          <a:schemeClr val="phClr"/>
-        </a:solidFill>
-        <a:gradFill rotWithShape="1">
-          <a:gsLst>
-            <a:gs pos="0">
-              <a:schemeClr val="phClr">
-                <a:tint val="40000"/>
-                <a:satMod val="350000"/>
-              </a:schemeClr>
-            </a:gs>
-            <a:gs pos="40000">
-              <a:schemeClr val="phClr">
-                <a:tint val="45000"/>
-                <a:shade val="99000"/>
-                <a:satMod val="350000"/>
-              </a:schemeClr>
-            </a:gs>
-            <a:gs pos="100000">
-              <a:schemeClr val="phClr">
-                <a:shade val="20000"/>
-                <a:satMod val="255000"/>
-              </a:schemeClr>
-            </a:gs>
-          </a:gsLst>
-          <a:path path="circle">
-            <a:fillToRect l="50000" t="-80000" r="50000" b="180000"/>
-          </a:path>
-        </a:gradFill>
-        <a:gradFill rotWithShape="1">
-          <a:gsLst>
-            <a:gs pos="0">
-              <a:schemeClr val="phClr">
-                <a:tint val="80000"/>
-                <a:satMod val="300000"/>
-              </a:schemeClr>
-            </a:gs>
-            <a:gs pos="100000">
-              <a:schemeClr val="phClr">
-                <a:shade val="30000"/>
-                <a:satMod val="200000"/>
-              </a:schemeClr>
-            </a:gs>
-          </a:gsLst>
-          <a:path path="circle">
-            <a:fillToRect l="50000" t="50000" r="50000" b="50000"/>
-          </a:path>
-        </a:gradFill>
-      </a:bgFillStyleLst>
-    </a:fmtScheme>
-  </a:themeElements>
-</a:theme>
 </file>
</xml_diff>